<commit_message>
Revise distributed systems lecture
</commit_message>
<xml_diff>
--- a/ex/553-S25/staging/553-S25/lectures/12b-distributed-systems.pptx
+++ b/ex/553-S25/staging/553-S25/lectures/12b-distributed-systems.pptx
@@ -5,29 +5,30 @@
     <p:sldMasterId id="2147483648" r:id="rId1"/>
   </p:sldMasterIdLst>
   <p:notesMasterIdLst>
-    <p:notesMasterId r:id="rId22"/>
+    <p:notesMasterId r:id="rId23"/>
   </p:notesMasterIdLst>
   <p:sldIdLst>
     <p:sldId id="1104" r:id="rId2"/>
     <p:sldId id="459" r:id="rId3"/>
     <p:sldId id="1235" r:id="rId4"/>
-    <p:sldId id="1237" r:id="rId5"/>
-    <p:sldId id="1251" r:id="rId6"/>
-    <p:sldId id="1252" r:id="rId7"/>
-    <p:sldId id="1253" r:id="rId8"/>
-    <p:sldId id="1254" r:id="rId9"/>
-    <p:sldId id="1241" r:id="rId10"/>
-    <p:sldId id="1255" r:id="rId11"/>
-    <p:sldId id="1242" r:id="rId12"/>
-    <p:sldId id="1243" r:id="rId13"/>
-    <p:sldId id="1256" r:id="rId14"/>
-    <p:sldId id="1257" r:id="rId15"/>
-    <p:sldId id="1245" r:id="rId16"/>
-    <p:sldId id="1249" r:id="rId17"/>
-    <p:sldId id="1246" r:id="rId18"/>
-    <p:sldId id="1248" r:id="rId19"/>
-    <p:sldId id="1250" r:id="rId20"/>
-    <p:sldId id="1258" r:id="rId21"/>
+    <p:sldId id="1260" r:id="rId5"/>
+    <p:sldId id="1237" r:id="rId6"/>
+    <p:sldId id="1251" r:id="rId7"/>
+    <p:sldId id="1252" r:id="rId8"/>
+    <p:sldId id="1253" r:id="rId9"/>
+    <p:sldId id="1254" r:id="rId10"/>
+    <p:sldId id="1241" r:id="rId11"/>
+    <p:sldId id="1255" r:id="rId12"/>
+    <p:sldId id="1242" r:id="rId13"/>
+    <p:sldId id="1243" r:id="rId14"/>
+    <p:sldId id="1256" r:id="rId15"/>
+    <p:sldId id="1257" r:id="rId16"/>
+    <p:sldId id="1245" r:id="rId17"/>
+    <p:sldId id="1249" r:id="rId18"/>
+    <p:sldId id="1246" r:id="rId19"/>
+    <p:sldId id="1248" r:id="rId20"/>
+    <p:sldId id="1250" r:id="rId21"/>
+    <p:sldId id="1258" r:id="rId22"/>
   </p:sldIdLst>
   <p:sldSz cx="12192000" cy="6858000"/>
   <p:notesSz cx="6858000" cy="9144000"/>
@@ -219,7 +220,7 @@
           <a:p>
             <a:fld id="{973C490B-630B-7F46-B6FE-05D0FD1689A8}" type="datetimeFigureOut">
               <a:rPr lang="en-US" smtClean="0"/>
-              <a:t>4/15/25</a:t>
+              <a:t>4/16/25</a:t>
             </a:fld>
             <a:endParaRPr lang="en-US"/>
           </a:p>
@@ -575,7 +576,7 @@
           <a:p>
             <a:fld id="{CE3F09D5-B346-194E-BAD1-FA5CF715891F}" type="slidenum">
               <a:rPr lang="en-US" smtClean="0"/>
-              <a:t>14</a:t>
+              <a:t>15</a:t>
             </a:fld>
             <a:endParaRPr lang="en-US"/>
           </a:p>
@@ -675,7 +676,7 @@
           <a:p>
             <a:fld id="{CE3F09D5-B346-194E-BAD1-FA5CF715891F}" type="slidenum">
               <a:rPr lang="en-US" smtClean="0"/>
-              <a:t>15</a:t>
+              <a:t>16</a:t>
             </a:fld>
             <a:endParaRPr lang="en-US"/>
           </a:p>
@@ -841,7 +842,7 @@
           <a:p>
             <a:fld id="{DEDCE603-2B12-5844-BEA7-E98E825B38C7}" type="datetimeFigureOut">
               <a:rPr lang="en-US" smtClean="0"/>
-              <a:t>4/15/25</a:t>
+              <a:t>4/16/25</a:t>
             </a:fld>
             <a:endParaRPr lang="en-US"/>
           </a:p>
@@ -1039,7 +1040,7 @@
           <a:p>
             <a:fld id="{DEDCE603-2B12-5844-BEA7-E98E825B38C7}" type="datetimeFigureOut">
               <a:rPr lang="en-US" smtClean="0"/>
-              <a:t>4/15/25</a:t>
+              <a:t>4/16/25</a:t>
             </a:fld>
             <a:endParaRPr lang="en-US"/>
           </a:p>
@@ -1247,7 +1248,7 @@
           <a:p>
             <a:fld id="{DEDCE603-2B12-5844-BEA7-E98E825B38C7}" type="datetimeFigureOut">
               <a:rPr lang="en-US" smtClean="0"/>
-              <a:t>4/15/25</a:t>
+              <a:t>4/16/25</a:t>
             </a:fld>
             <a:endParaRPr lang="en-US"/>
           </a:p>
@@ -1456,7 +1457,7 @@
           <a:p>
             <a:fld id="{DEDCE603-2B12-5844-BEA7-E98E825B38C7}" type="datetimeFigureOut">
               <a:rPr lang="en-US" smtClean="0"/>
-              <a:t>4/15/25</a:t>
+              <a:t>4/16/25</a:t>
             </a:fld>
             <a:endParaRPr lang="en-US"/>
           </a:p>
@@ -1731,7 +1732,7 @@
           <a:p>
             <a:fld id="{DEDCE603-2B12-5844-BEA7-E98E825B38C7}" type="datetimeFigureOut">
               <a:rPr lang="en-US" smtClean="0"/>
-              <a:t>4/15/25</a:t>
+              <a:t>4/16/25</a:t>
             </a:fld>
             <a:endParaRPr lang="en-US"/>
           </a:p>
@@ -1996,7 +1997,7 @@
           <a:p>
             <a:fld id="{DEDCE603-2B12-5844-BEA7-E98E825B38C7}" type="datetimeFigureOut">
               <a:rPr lang="en-US" smtClean="0"/>
-              <a:t>4/15/25</a:t>
+              <a:t>4/16/25</a:t>
             </a:fld>
             <a:endParaRPr lang="en-US"/>
           </a:p>
@@ -2408,7 +2409,7 @@
           <a:p>
             <a:fld id="{DEDCE603-2B12-5844-BEA7-E98E825B38C7}" type="datetimeFigureOut">
               <a:rPr lang="en-US" smtClean="0"/>
-              <a:t>4/15/25</a:t>
+              <a:t>4/16/25</a:t>
             </a:fld>
             <a:endParaRPr lang="en-US"/>
           </a:p>
@@ -2549,7 +2550,7 @@
           <a:p>
             <a:fld id="{DEDCE603-2B12-5844-BEA7-E98E825B38C7}" type="datetimeFigureOut">
               <a:rPr lang="en-US" smtClean="0"/>
-              <a:t>4/15/25</a:t>
+              <a:t>4/16/25</a:t>
             </a:fld>
             <a:endParaRPr lang="en-US"/>
           </a:p>
@@ -2662,7 +2663,7 @@
           <a:p>
             <a:fld id="{DEDCE603-2B12-5844-BEA7-E98E825B38C7}" type="datetimeFigureOut">
               <a:rPr lang="en-US" smtClean="0"/>
-              <a:t>4/15/25</a:t>
+              <a:t>4/16/25</a:t>
             </a:fld>
             <a:endParaRPr lang="en-US"/>
           </a:p>
@@ -2973,7 +2974,7 @@
           <a:p>
             <a:fld id="{DEDCE603-2B12-5844-BEA7-E98E825B38C7}" type="datetimeFigureOut">
               <a:rPr lang="en-US" smtClean="0"/>
-              <a:t>4/15/25</a:t>
+              <a:t>4/16/25</a:t>
             </a:fld>
             <a:endParaRPr lang="en-US"/>
           </a:p>
@@ -3261,7 +3262,7 @@
           <a:p>
             <a:fld id="{DEDCE603-2B12-5844-BEA7-E98E825B38C7}" type="datetimeFigureOut">
               <a:rPr lang="en-US" smtClean="0"/>
-              <a:t>4/15/25</a:t>
+              <a:t>4/16/25</a:t>
             </a:fld>
             <a:endParaRPr lang="en-US"/>
           </a:p>
@@ -3502,7 +3503,7 @@
           <a:p>
             <a:fld id="{DEDCE603-2B12-5844-BEA7-E98E825B38C7}" type="datetimeFigureOut">
               <a:rPr lang="en-US" smtClean="0"/>
-              <a:t>4/15/25</a:t>
+              <a:t>4/16/25</a:t>
             </a:fld>
             <a:endParaRPr lang="en-US"/>
           </a:p>
@@ -4291,6 +4292,317 @@
   <p:cSld>
     <p:spTree>
       <p:nvGrpSpPr>
+        <p:cNvPr id="1" name=""/>
+        <p:cNvGrpSpPr/>
+        <p:nvPr/>
+      </p:nvGrpSpPr>
+      <p:grpSpPr>
+        <a:xfrm>
+          <a:off x="0" y="0"/>
+          <a:ext cx="0" cy="0"/>
+          <a:chOff x="0" y="0"/>
+          <a:chExt cx="0" cy="0"/>
+        </a:xfrm>
+      </p:grpSpPr>
+      <p:sp>
+        <p:nvSpPr>
+          <p:cNvPr id="2" name="Title 1">
+            <a:extLst>
+              <a:ext uri="{FF2B5EF4-FFF2-40B4-BE49-F238E27FC236}">
+                <a16:creationId xmlns:a16="http://schemas.microsoft.com/office/drawing/2014/main" id="{A9E77AE0-A5E4-642E-6FA5-80B45A4B3457}"/>
+              </a:ext>
+            </a:extLst>
+          </p:cNvPr>
+          <p:cNvSpPr>
+            <a:spLocks noGrp="1"/>
+          </p:cNvSpPr>
+          <p:nvPr>
+            <p:ph type="title"/>
+          </p:nvPr>
+        </p:nvSpPr>
+        <p:spPr/>
+        <p:txBody>
+          <a:bodyPr/>
+          <a:lstStyle/>
+          <a:p>
+            <a:r>
+              <a:rPr lang="en-US" dirty="0"/>
+              <a:t>Properties we want: </a:t>
+            </a:r>
+            <a:r>
+              <a:rPr lang="en-US" dirty="0">
+                <a:solidFill>
+                  <a:srgbClr val="C00000"/>
+                </a:solidFill>
+              </a:rPr>
+              <a:t>Safety</a:t>
+            </a:r>
+          </a:p>
+        </p:txBody>
+      </p:sp>
+      <p:sp>
+        <p:nvSpPr>
+          <p:cNvPr id="3" name="Content Placeholder 2">
+            <a:extLst>
+              <a:ext uri="{FF2B5EF4-FFF2-40B4-BE49-F238E27FC236}">
+                <a16:creationId xmlns:a16="http://schemas.microsoft.com/office/drawing/2014/main" id="{3ADD0170-54DF-D8E4-582C-EECA29EDE33F}"/>
+              </a:ext>
+            </a:extLst>
+          </p:cNvPr>
+          <p:cNvSpPr>
+            <a:spLocks noGrp="1"/>
+          </p:cNvSpPr>
+          <p:nvPr>
+            <p:ph idx="1"/>
+          </p:nvPr>
+        </p:nvSpPr>
+        <p:spPr>
+          <a:xfrm>
+            <a:off x="838200" y="1825624"/>
+            <a:ext cx="10515600" cy="5032376"/>
+          </a:xfrm>
+        </p:spPr>
+        <p:txBody>
+          <a:bodyPr/>
+          <a:lstStyle/>
+          <a:p>
+            <a:r>
+              <a:rPr lang="en-US" dirty="0"/>
+              <a:t>If a majority of nodes have agreed on one value, that value cannot change in the future</a:t>
+            </a:r>
+          </a:p>
+          <a:p>
+            <a:endParaRPr lang="en-US" dirty="0"/>
+          </a:p>
+          <a:p>
+            <a:r>
+              <a:rPr lang="en-US" dirty="0"/>
+              <a:t>e.g., using a different majority or the same majority</a:t>
+            </a:r>
+          </a:p>
+          <a:p>
+            <a:pPr lvl="1"/>
+            <a:endParaRPr lang="en-US" dirty="0"/>
+          </a:p>
+          <a:p>
+            <a:r>
+              <a:rPr lang="en-US" dirty="0"/>
+              <a:t>We call this value the </a:t>
+            </a:r>
+            <a:r>
+              <a:rPr lang="en-US" dirty="0">
+                <a:solidFill>
+                  <a:srgbClr val="C00000"/>
+                </a:solidFill>
+              </a:rPr>
+              <a:t>chosen</a:t>
+            </a:r>
+            <a:r>
+              <a:rPr lang="en-US" dirty="0"/>
+              <a:t> value</a:t>
+            </a:r>
+          </a:p>
+          <a:p>
+            <a:pPr lvl="1"/>
+            <a:endParaRPr lang="en-US" dirty="0"/>
+          </a:p>
+        </p:txBody>
+      </p:sp>
+    </p:spTree>
+    <p:extLst>
+      <p:ext uri="{BB962C8B-B14F-4D97-AF65-F5344CB8AC3E}">
+        <p14:creationId xmlns:p14="http://schemas.microsoft.com/office/powerpoint/2010/main" val="603974117"/>
+      </p:ext>
+    </p:extLst>
+  </p:cSld>
+  <p:clrMapOvr>
+    <a:masterClrMapping/>
+  </p:clrMapOvr>
+  <p:timing>
+    <p:tnLst>
+      <p:par>
+        <p:cTn id="1" dur="indefinite" restart="never" nodeType="tmRoot">
+          <p:childTnLst>
+            <p:seq concurrent="1" nextAc="seek">
+              <p:cTn id="2" dur="indefinite" nodeType="mainSeq">
+                <p:childTnLst>
+                  <p:par>
+                    <p:cTn id="3" fill="hold">
+                      <p:stCondLst>
+                        <p:cond delay="indefinite"/>
+                      </p:stCondLst>
+                      <p:childTnLst>
+                        <p:par>
+                          <p:cTn id="4" fill="hold">
+                            <p:stCondLst>
+                              <p:cond delay="0"/>
+                            </p:stCondLst>
+                            <p:childTnLst>
+                              <p:par>
+                                <p:cTn id="5" presetID="1" presetClass="entr" presetSubtype="0" fill="hold" nodeType="clickEffect">
+                                  <p:stCondLst>
+                                    <p:cond delay="0"/>
+                                  </p:stCondLst>
+                                  <p:childTnLst>
+                                    <p:set>
+                                      <p:cBhvr>
+                                        <p:cTn id="6" dur="1" fill="hold">
+                                          <p:stCondLst>
+                                            <p:cond delay="0"/>
+                                          </p:stCondLst>
+                                        </p:cTn>
+                                        <p:tgtEl>
+                                          <p:spTgt spid="3">
+                                            <p:txEl>
+                                              <p:pRg st="0" end="0"/>
+                                            </p:txEl>
+                                          </p:spTgt>
+                                        </p:tgtEl>
+                                        <p:attrNameLst>
+                                          <p:attrName>style.visibility</p:attrName>
+                                        </p:attrNameLst>
+                                      </p:cBhvr>
+                                      <p:to>
+                                        <p:strVal val="visible"/>
+                                      </p:to>
+                                    </p:set>
+                                  </p:childTnLst>
+                                </p:cTn>
+                              </p:par>
+                            </p:childTnLst>
+                          </p:cTn>
+                        </p:par>
+                      </p:childTnLst>
+                    </p:cTn>
+                  </p:par>
+                  <p:par>
+                    <p:cTn id="7" fill="hold">
+                      <p:stCondLst>
+                        <p:cond delay="indefinite"/>
+                      </p:stCondLst>
+                      <p:childTnLst>
+                        <p:par>
+                          <p:cTn id="8" fill="hold">
+                            <p:stCondLst>
+                              <p:cond delay="0"/>
+                            </p:stCondLst>
+                            <p:childTnLst>
+                              <p:par>
+                                <p:cTn id="9" presetID="1" presetClass="entr" presetSubtype="0" fill="hold" nodeType="clickEffect">
+                                  <p:stCondLst>
+                                    <p:cond delay="0"/>
+                                  </p:stCondLst>
+                                  <p:childTnLst>
+                                    <p:set>
+                                      <p:cBhvr>
+                                        <p:cTn id="10" dur="1" fill="hold">
+                                          <p:stCondLst>
+                                            <p:cond delay="0"/>
+                                          </p:stCondLst>
+                                        </p:cTn>
+                                        <p:tgtEl>
+                                          <p:spTgt spid="3">
+                                            <p:txEl>
+                                              <p:pRg st="2" end="2"/>
+                                            </p:txEl>
+                                          </p:spTgt>
+                                        </p:tgtEl>
+                                        <p:attrNameLst>
+                                          <p:attrName>style.visibility</p:attrName>
+                                        </p:attrNameLst>
+                                      </p:cBhvr>
+                                      <p:to>
+                                        <p:strVal val="visible"/>
+                                      </p:to>
+                                    </p:set>
+                                  </p:childTnLst>
+                                </p:cTn>
+                              </p:par>
+                            </p:childTnLst>
+                          </p:cTn>
+                        </p:par>
+                      </p:childTnLst>
+                    </p:cTn>
+                  </p:par>
+                  <p:par>
+                    <p:cTn id="11" fill="hold">
+                      <p:stCondLst>
+                        <p:cond delay="indefinite"/>
+                      </p:stCondLst>
+                      <p:childTnLst>
+                        <p:par>
+                          <p:cTn id="12" fill="hold">
+                            <p:stCondLst>
+                              <p:cond delay="0"/>
+                            </p:stCondLst>
+                            <p:childTnLst>
+                              <p:par>
+                                <p:cTn id="13" presetID="1" presetClass="entr" presetSubtype="0" fill="hold" nodeType="clickEffect">
+                                  <p:stCondLst>
+                                    <p:cond delay="0"/>
+                                  </p:stCondLst>
+                                  <p:childTnLst>
+                                    <p:set>
+                                      <p:cBhvr>
+                                        <p:cTn id="14" dur="1" fill="hold">
+                                          <p:stCondLst>
+                                            <p:cond delay="0"/>
+                                          </p:stCondLst>
+                                        </p:cTn>
+                                        <p:tgtEl>
+                                          <p:spTgt spid="3">
+                                            <p:txEl>
+                                              <p:pRg st="4" end="4"/>
+                                            </p:txEl>
+                                          </p:spTgt>
+                                        </p:tgtEl>
+                                        <p:attrNameLst>
+                                          <p:attrName>style.visibility</p:attrName>
+                                        </p:attrNameLst>
+                                      </p:cBhvr>
+                                      <p:to>
+                                        <p:strVal val="visible"/>
+                                      </p:to>
+                                    </p:set>
+                                  </p:childTnLst>
+                                </p:cTn>
+                              </p:par>
+                            </p:childTnLst>
+                          </p:cTn>
+                        </p:par>
+                      </p:childTnLst>
+                    </p:cTn>
+                  </p:par>
+                </p:childTnLst>
+              </p:cTn>
+              <p:prevCondLst>
+                <p:cond evt="onPrev" delay="0">
+                  <p:tgtEl>
+                    <p:sldTgt/>
+                  </p:tgtEl>
+                </p:cond>
+              </p:prevCondLst>
+              <p:nextCondLst>
+                <p:cond evt="onNext" delay="0">
+                  <p:tgtEl>
+                    <p:sldTgt/>
+                  </p:tgtEl>
+                </p:cond>
+              </p:nextCondLst>
+            </p:seq>
+          </p:childTnLst>
+        </p:cTn>
+      </p:par>
+    </p:tnLst>
+  </p:timing>
+</p:sld>
+</file>
+
+<file path=ppt/slides/slide11.xml><?xml version="1.0" encoding="utf-8"?>
+<p:sld xmlns:a="http://schemas.openxmlformats.org/drawingml/2006/main" xmlns:r="http://schemas.openxmlformats.org/officeDocument/2006/relationships" xmlns:p="http://schemas.openxmlformats.org/presentationml/2006/main">
+  <p:cSld>
+    <p:spTree>
+      <p:nvGrpSpPr>
         <p:cNvPr id="1" name="">
           <a:extLst>
             <a:ext uri="{FF2B5EF4-FFF2-40B4-BE49-F238E27FC236}">
@@ -4685,7 +4997,7 @@
 </p:sld>
 </file>
 
-<file path=ppt/slides/slide11.xml><?xml version="1.0" encoding="utf-8"?>
+<file path=ppt/slides/slide12.xml><?xml version="1.0" encoding="utf-8"?>
 <p:sld xmlns:a="http://schemas.openxmlformats.org/drawingml/2006/main" xmlns:r="http://schemas.openxmlformats.org/officeDocument/2006/relationships" xmlns:p="http://schemas.openxmlformats.org/presentationml/2006/main">
   <p:cSld>
     <p:spTree>
@@ -5296,7 +5608,7 @@
 </p:sld>
 </file>
 
-<file path=ppt/slides/slide12.xml><?xml version="1.0" encoding="utf-8"?>
+<file path=ppt/slides/slide13.xml><?xml version="1.0" encoding="utf-8"?>
 <p:sld xmlns:a="http://schemas.openxmlformats.org/drawingml/2006/main" xmlns:r="http://schemas.openxmlformats.org/officeDocument/2006/relationships" xmlns:p="http://schemas.openxmlformats.org/presentationml/2006/main">
   <p:cSld>
     <p:spTree>
@@ -5648,7 +5960,7 @@
 </p:sld>
 </file>
 
-<file path=ppt/slides/slide13.xml><?xml version="1.0" encoding="utf-8"?>
+<file path=ppt/slides/slide14.xml><?xml version="1.0" encoding="utf-8"?>
 <p:sld xmlns:a="http://schemas.openxmlformats.org/drawingml/2006/main" xmlns:r="http://schemas.openxmlformats.org/officeDocument/2006/relationships" xmlns:p="http://schemas.openxmlformats.org/presentationml/2006/main">
   <p:cSld>
     <p:spTree>
@@ -6059,7 +6371,7 @@
 </p:sld>
 </file>
 
-<file path=ppt/slides/slide14.xml><?xml version="1.0" encoding="utf-8"?>
+<file path=ppt/slides/slide15.xml><?xml version="1.0" encoding="utf-8"?>
 <p:sld xmlns:a="http://schemas.openxmlformats.org/drawingml/2006/main" xmlns:r="http://schemas.openxmlformats.org/officeDocument/2006/relationships" xmlns:p="http://schemas.openxmlformats.org/presentationml/2006/main">
   <p:cSld>
     <p:spTree>
@@ -6119,7 +6431,7 @@
 </p:sld>
 </file>
 
-<file path=ppt/slides/slide15.xml><?xml version="1.0" encoding="utf-8"?>
+<file path=ppt/slides/slide16.xml><?xml version="1.0" encoding="utf-8"?>
 <p:sld xmlns:a="http://schemas.openxmlformats.org/drawingml/2006/main" xmlns:r="http://schemas.openxmlformats.org/officeDocument/2006/relationships" xmlns:p="http://schemas.openxmlformats.org/presentationml/2006/main">
   <p:cSld>
     <p:spTree>
@@ -6233,7 +6545,7 @@
 </p:sld>
 </file>
 
-<file path=ppt/slides/slide16.xml><?xml version="1.0" encoding="utf-8"?>
+<file path=ppt/slides/slide17.xml><?xml version="1.0" encoding="utf-8"?>
 <p:sld xmlns:a="http://schemas.openxmlformats.org/drawingml/2006/main" xmlns:r="http://schemas.openxmlformats.org/officeDocument/2006/relationships" xmlns:p="http://schemas.openxmlformats.org/presentationml/2006/main">
   <p:cSld>
     <p:spTree>
@@ -6599,7 +6911,7 @@
 </p:sld>
 </file>
 
-<file path=ppt/slides/slide17.xml><?xml version="1.0" encoding="utf-8"?>
+<file path=ppt/slides/slide18.xml><?xml version="1.0" encoding="utf-8"?>
 <p:sld xmlns:a="http://schemas.openxmlformats.org/drawingml/2006/main" xmlns:r="http://schemas.openxmlformats.org/officeDocument/2006/relationships" xmlns:p="http://schemas.openxmlformats.org/presentationml/2006/main">
   <p:cSld>
     <p:spTree>
@@ -7002,7 +7314,7 @@
 </p:sld>
 </file>
 
-<file path=ppt/slides/slide18.xml><?xml version="1.0" encoding="utf-8"?>
+<file path=ppt/slides/slide19.xml><?xml version="1.0" encoding="utf-8"?>
 <p:sld xmlns:a="http://schemas.openxmlformats.org/drawingml/2006/main" xmlns:r="http://schemas.openxmlformats.org/officeDocument/2006/relationships" xmlns:p="http://schemas.openxmlformats.org/presentationml/2006/main">
   <p:cSld>
     <p:spTree>
@@ -7285,483 +7597,6 @@
 </p:sld>
 </file>
 
-<file path=ppt/slides/slide19.xml><?xml version="1.0" encoding="utf-8"?>
-<p:sld xmlns:a="http://schemas.openxmlformats.org/drawingml/2006/main" xmlns:r="http://schemas.openxmlformats.org/officeDocument/2006/relationships" xmlns:p="http://schemas.openxmlformats.org/presentationml/2006/main">
-  <p:cSld>
-    <p:spTree>
-      <p:nvGrpSpPr>
-        <p:cNvPr id="1" name=""/>
-        <p:cNvGrpSpPr/>
-        <p:nvPr/>
-      </p:nvGrpSpPr>
-      <p:grpSpPr>
-        <a:xfrm>
-          <a:off x="0" y="0"/>
-          <a:ext cx="0" cy="0"/>
-          <a:chOff x="0" y="0"/>
-          <a:chExt cx="0" cy="0"/>
-        </a:xfrm>
-      </p:grpSpPr>
-      <p:pic>
-        <p:nvPicPr>
-          <p:cNvPr id="7" name="Picture 6" descr="A diagram of a proposal&#10;&#10;AI-generated content may be incorrect.">
-            <a:extLst>
-              <a:ext uri="{FF2B5EF4-FFF2-40B4-BE49-F238E27FC236}">
-                <a16:creationId xmlns:a16="http://schemas.microsoft.com/office/drawing/2014/main" id="{4A60ED62-A002-A777-BDBC-3AB629647BC7}"/>
-              </a:ext>
-            </a:extLst>
-          </p:cNvPr>
-          <p:cNvPicPr>
-            <a:picLocks noChangeAspect="1"/>
-          </p:cNvPicPr>
-          <p:nvPr/>
-        </p:nvPicPr>
-        <p:blipFill>
-          <a:blip r:embed="rId2"/>
-          <a:stretch>
-            <a:fillRect/>
-          </a:stretch>
-        </p:blipFill>
-        <p:spPr>
-          <a:xfrm>
-            <a:off x="5109061" y="3281830"/>
-            <a:ext cx="6963909" cy="3420053"/>
-          </a:xfrm>
-          <a:prstGeom prst="rect">
-            <a:avLst/>
-          </a:prstGeom>
-        </p:spPr>
-      </p:pic>
-      <p:sp>
-        <p:nvSpPr>
-          <p:cNvPr id="2" name="Title 1">
-            <a:extLst>
-              <a:ext uri="{FF2B5EF4-FFF2-40B4-BE49-F238E27FC236}">
-                <a16:creationId xmlns:a16="http://schemas.microsoft.com/office/drawing/2014/main" id="{BE1AE74B-BF4B-EBBA-5E40-75313B765210}"/>
-              </a:ext>
-            </a:extLst>
-          </p:cNvPr>
-          <p:cNvSpPr>
-            <a:spLocks noGrp="1"/>
-          </p:cNvSpPr>
-          <p:nvPr>
-            <p:ph type="title"/>
-          </p:nvPr>
-        </p:nvSpPr>
-        <p:spPr/>
-        <p:txBody>
-          <a:bodyPr/>
-          <a:lstStyle/>
-          <a:p>
-            <a:r>
-              <a:rPr lang="en-US" dirty="0"/>
-              <a:t>Improvements and Considerations</a:t>
-            </a:r>
-          </a:p>
-        </p:txBody>
-      </p:sp>
-      <p:sp>
-        <p:nvSpPr>
-          <p:cNvPr id="3" name="Content Placeholder 2">
-            <a:extLst>
-              <a:ext uri="{FF2B5EF4-FFF2-40B4-BE49-F238E27FC236}">
-                <a16:creationId xmlns:a16="http://schemas.microsoft.com/office/drawing/2014/main" id="{07E9B90B-F86E-BA4E-0B80-15BF5FBD4C3A}"/>
-              </a:ext>
-            </a:extLst>
-          </p:cNvPr>
-          <p:cNvSpPr>
-            <a:spLocks noGrp="1"/>
-          </p:cNvSpPr>
-          <p:nvPr>
-            <p:ph idx="1"/>
-          </p:nvPr>
-        </p:nvSpPr>
-        <p:spPr>
-          <a:xfrm>
-            <a:off x="838200" y="1572322"/>
-            <a:ext cx="10515600" cy="5129561"/>
-          </a:xfrm>
-        </p:spPr>
-        <p:txBody>
-          <a:bodyPr>
-            <a:normAutofit/>
-          </a:bodyPr>
-          <a:lstStyle/>
-          <a:p>
-            <a:r>
-              <a:rPr lang="en-US" dirty="0">
-                <a:solidFill>
-                  <a:srgbClr val="C00000"/>
-                </a:solidFill>
-              </a:rPr>
-              <a:t>Agreeing on multiple values and ordering</a:t>
-            </a:r>
-          </a:p>
-          <a:p>
-            <a:r>
-              <a:rPr lang="en-US" dirty="0"/>
-              <a:t>e.g., multi-</a:t>
-            </a:r>
-            <a:r>
-              <a:rPr lang="en-US" dirty="0" err="1"/>
-              <a:t>paxos</a:t>
-            </a:r>
-            <a:r>
-              <a:rPr lang="en-US" dirty="0"/>
-              <a:t>: Elect a distinguished node (leader)</a:t>
-            </a:r>
-          </a:p>
-          <a:p>
-            <a:r>
-              <a:rPr lang="en-US" dirty="0"/>
-              <a:t>only execute phase 2 afterwards until failure</a:t>
-            </a:r>
-          </a:p>
-          <a:p>
-            <a:endParaRPr lang="en-US" dirty="0"/>
-          </a:p>
-          <a:p>
-            <a:r>
-              <a:rPr lang="en-US" dirty="0"/>
-              <a:t>Other protocols</a:t>
-            </a:r>
-          </a:p>
-          <a:p>
-            <a:pPr lvl="1"/>
-            <a:r>
-              <a:rPr lang="en-US" dirty="0" err="1"/>
-              <a:t>Epaxos</a:t>
-            </a:r>
-            <a:r>
-              <a:rPr lang="en-US" dirty="0"/>
-              <a:t>, Mencius, RAFT</a:t>
-            </a:r>
-          </a:p>
-        </p:txBody>
-      </p:sp>
-    </p:spTree>
-    <p:extLst>
-      <p:ext uri="{BB962C8B-B14F-4D97-AF65-F5344CB8AC3E}">
-        <p14:creationId xmlns:p14="http://schemas.microsoft.com/office/powerpoint/2010/main" val="1258571092"/>
-      </p:ext>
-    </p:extLst>
-  </p:cSld>
-  <p:clrMapOvr>
-    <a:masterClrMapping/>
-  </p:clrMapOvr>
-  <p:timing>
-    <p:tnLst>
-      <p:par>
-        <p:cTn id="1" dur="indefinite" restart="never" nodeType="tmRoot">
-          <p:childTnLst>
-            <p:seq concurrent="1" nextAc="seek">
-              <p:cTn id="2" dur="indefinite" nodeType="mainSeq">
-                <p:childTnLst>
-                  <p:par>
-                    <p:cTn id="3" fill="hold">
-                      <p:stCondLst>
-                        <p:cond delay="indefinite"/>
-                      </p:stCondLst>
-                      <p:childTnLst>
-                        <p:par>
-                          <p:cTn id="4" fill="hold">
-                            <p:stCondLst>
-                              <p:cond delay="0"/>
-                            </p:stCondLst>
-                            <p:childTnLst>
-                              <p:par>
-                                <p:cTn id="5" presetID="1" presetClass="entr" presetSubtype="0" fill="hold" nodeType="clickEffect">
-                                  <p:stCondLst>
-                                    <p:cond delay="0"/>
-                                  </p:stCondLst>
-                                  <p:childTnLst>
-                                    <p:set>
-                                      <p:cBhvr>
-                                        <p:cTn id="6" dur="1" fill="hold">
-                                          <p:stCondLst>
-                                            <p:cond delay="0"/>
-                                          </p:stCondLst>
-                                        </p:cTn>
-                                        <p:tgtEl>
-                                          <p:spTgt spid="3">
-                                            <p:txEl>
-                                              <p:pRg st="0" end="0"/>
-                                            </p:txEl>
-                                          </p:spTgt>
-                                        </p:tgtEl>
-                                        <p:attrNameLst>
-                                          <p:attrName>style.visibility</p:attrName>
-                                        </p:attrNameLst>
-                                      </p:cBhvr>
-                                      <p:to>
-                                        <p:strVal val="visible"/>
-                                      </p:to>
-                                    </p:set>
-                                  </p:childTnLst>
-                                </p:cTn>
-                              </p:par>
-                              <p:par>
-                                <p:cTn id="7" presetID="1" presetClass="entr" presetSubtype="0" fill="hold" nodeType="withEffect">
-                                  <p:stCondLst>
-                                    <p:cond delay="0"/>
-                                  </p:stCondLst>
-                                  <p:childTnLst>
-                                    <p:set>
-                                      <p:cBhvr>
-                                        <p:cTn id="8" dur="1" fill="hold">
-                                          <p:stCondLst>
-                                            <p:cond delay="0"/>
-                                          </p:stCondLst>
-                                        </p:cTn>
-                                        <p:tgtEl>
-                                          <p:spTgt spid="3">
-                                            <p:txEl>
-                                              <p:pRg st="1" end="1"/>
-                                            </p:txEl>
-                                          </p:spTgt>
-                                        </p:tgtEl>
-                                        <p:attrNameLst>
-                                          <p:attrName>style.visibility</p:attrName>
-                                        </p:attrNameLst>
-                                      </p:cBhvr>
-                                      <p:to>
-                                        <p:strVal val="visible"/>
-                                      </p:to>
-                                    </p:set>
-                                  </p:childTnLst>
-                                </p:cTn>
-                              </p:par>
-                            </p:childTnLst>
-                          </p:cTn>
-                        </p:par>
-                      </p:childTnLst>
-                    </p:cTn>
-                  </p:par>
-                  <p:par>
-                    <p:cTn id="9" fill="hold">
-                      <p:stCondLst>
-                        <p:cond delay="indefinite"/>
-                      </p:stCondLst>
-                      <p:childTnLst>
-                        <p:par>
-                          <p:cTn id="10" fill="hold">
-                            <p:stCondLst>
-                              <p:cond delay="0"/>
-                            </p:stCondLst>
-                            <p:childTnLst>
-                              <p:par>
-                                <p:cTn id="11" presetID="9" presetClass="entr" presetSubtype="0" fill="hold" nodeType="clickEffect">
-                                  <p:stCondLst>
-                                    <p:cond delay="0"/>
-                                  </p:stCondLst>
-                                  <p:childTnLst>
-                                    <p:set>
-                                      <p:cBhvr>
-                                        <p:cTn id="12" dur="1" fill="hold">
-                                          <p:stCondLst>
-                                            <p:cond delay="0"/>
-                                          </p:stCondLst>
-                                        </p:cTn>
-                                        <p:tgtEl>
-                                          <p:spTgt spid="7"/>
-                                        </p:tgtEl>
-                                        <p:attrNameLst>
-                                          <p:attrName>style.visibility</p:attrName>
-                                        </p:attrNameLst>
-                                      </p:cBhvr>
-                                      <p:to>
-                                        <p:strVal val="visible"/>
-                                      </p:to>
-                                    </p:set>
-                                    <p:animEffect transition="in" filter="dissolve">
-                                      <p:cBhvr>
-                                        <p:cTn id="13" dur="500"/>
-                                        <p:tgtEl>
-                                          <p:spTgt spid="7"/>
-                                        </p:tgtEl>
-                                      </p:cBhvr>
-                                    </p:animEffect>
-                                  </p:childTnLst>
-                                </p:cTn>
-                              </p:par>
-                            </p:childTnLst>
-                          </p:cTn>
-                        </p:par>
-                      </p:childTnLst>
-                    </p:cTn>
-                  </p:par>
-                  <p:par>
-                    <p:cTn id="14" fill="hold">
-                      <p:stCondLst>
-                        <p:cond delay="indefinite"/>
-                      </p:stCondLst>
-                      <p:childTnLst>
-                        <p:par>
-                          <p:cTn id="15" fill="hold">
-                            <p:stCondLst>
-                              <p:cond delay="0"/>
-                            </p:stCondLst>
-                            <p:childTnLst>
-                              <p:par>
-                                <p:cTn id="16" presetID="1" presetClass="entr" presetSubtype="0" fill="hold" nodeType="clickEffect">
-                                  <p:stCondLst>
-                                    <p:cond delay="0"/>
-                                  </p:stCondLst>
-                                  <p:childTnLst>
-                                    <p:set>
-                                      <p:cBhvr>
-                                        <p:cTn id="17" dur="1" fill="hold">
-                                          <p:stCondLst>
-                                            <p:cond delay="0"/>
-                                          </p:stCondLst>
-                                        </p:cTn>
-                                        <p:tgtEl>
-                                          <p:spTgt spid="3">
-                                            <p:txEl>
-                                              <p:pRg st="2" end="2"/>
-                                            </p:txEl>
-                                          </p:spTgt>
-                                        </p:tgtEl>
-                                        <p:attrNameLst>
-                                          <p:attrName>style.visibility</p:attrName>
-                                        </p:attrNameLst>
-                                      </p:cBhvr>
-                                      <p:to>
-                                        <p:strVal val="visible"/>
-                                      </p:to>
-                                    </p:set>
-                                  </p:childTnLst>
-                                </p:cTn>
-                              </p:par>
-                            </p:childTnLst>
-                          </p:cTn>
-                        </p:par>
-                      </p:childTnLst>
-                    </p:cTn>
-                  </p:par>
-                  <p:par>
-                    <p:cTn id="18" fill="hold">
-                      <p:stCondLst>
-                        <p:cond delay="indefinite"/>
-                      </p:stCondLst>
-                      <p:childTnLst>
-                        <p:par>
-                          <p:cTn id="19" fill="hold">
-                            <p:stCondLst>
-                              <p:cond delay="0"/>
-                            </p:stCondLst>
-                            <p:childTnLst>
-                              <p:par>
-                                <p:cTn id="20" presetID="1" presetClass="entr" presetSubtype="0" fill="hold" nodeType="clickEffect">
-                                  <p:stCondLst>
-                                    <p:cond delay="0"/>
-                                  </p:stCondLst>
-                                  <p:childTnLst>
-                                    <p:set>
-                                      <p:cBhvr>
-                                        <p:cTn id="21" dur="1" fill="hold">
-                                          <p:stCondLst>
-                                            <p:cond delay="0"/>
-                                          </p:stCondLst>
-                                        </p:cTn>
-                                        <p:tgtEl>
-                                          <p:spTgt spid="3">
-                                            <p:txEl>
-                                              <p:pRg st="4" end="4"/>
-                                            </p:txEl>
-                                          </p:spTgt>
-                                        </p:tgtEl>
-                                        <p:attrNameLst>
-                                          <p:attrName>style.visibility</p:attrName>
-                                        </p:attrNameLst>
-                                      </p:cBhvr>
-                                      <p:to>
-                                        <p:strVal val="visible"/>
-                                      </p:to>
-                                    </p:set>
-                                  </p:childTnLst>
-                                </p:cTn>
-                              </p:par>
-                            </p:childTnLst>
-                          </p:cTn>
-                        </p:par>
-                      </p:childTnLst>
-                    </p:cTn>
-                  </p:par>
-                  <p:par>
-                    <p:cTn id="22" fill="hold">
-                      <p:stCondLst>
-                        <p:cond delay="indefinite"/>
-                      </p:stCondLst>
-                      <p:childTnLst>
-                        <p:par>
-                          <p:cTn id="23" fill="hold">
-                            <p:stCondLst>
-                              <p:cond delay="0"/>
-                            </p:stCondLst>
-                            <p:childTnLst>
-                              <p:par>
-                                <p:cTn id="24" presetID="1" presetClass="entr" presetSubtype="0" fill="hold" nodeType="clickEffect">
-                                  <p:stCondLst>
-                                    <p:cond delay="0"/>
-                                  </p:stCondLst>
-                                  <p:childTnLst>
-                                    <p:set>
-                                      <p:cBhvr>
-                                        <p:cTn id="25" dur="1" fill="hold">
-                                          <p:stCondLst>
-                                            <p:cond delay="0"/>
-                                          </p:stCondLst>
-                                        </p:cTn>
-                                        <p:tgtEl>
-                                          <p:spTgt spid="3">
-                                            <p:txEl>
-                                              <p:pRg st="5" end="5"/>
-                                            </p:txEl>
-                                          </p:spTgt>
-                                        </p:tgtEl>
-                                        <p:attrNameLst>
-                                          <p:attrName>style.visibility</p:attrName>
-                                        </p:attrNameLst>
-                                      </p:cBhvr>
-                                      <p:to>
-                                        <p:strVal val="visible"/>
-                                      </p:to>
-                                    </p:set>
-                                  </p:childTnLst>
-                                </p:cTn>
-                              </p:par>
-                            </p:childTnLst>
-                          </p:cTn>
-                        </p:par>
-                      </p:childTnLst>
-                    </p:cTn>
-                  </p:par>
-                </p:childTnLst>
-              </p:cTn>
-              <p:prevCondLst>
-                <p:cond evt="onPrev" delay="0">
-                  <p:tgtEl>
-                    <p:sldTgt/>
-                  </p:tgtEl>
-                </p:cond>
-              </p:prevCondLst>
-              <p:nextCondLst>
-                <p:cond evt="onNext" delay="0">
-                  <p:tgtEl>
-                    <p:sldTgt/>
-                  </p:tgtEl>
-                </p:cond>
-              </p:nextCondLst>
-            </p:seq>
-          </p:childTnLst>
-        </p:cTn>
-      </p:par>
-    </p:tnLst>
-  </p:timing>
-</p:sld>
-</file>
-
 <file path=ppt/slides/slide2.xml><?xml version="1.0" encoding="utf-8"?>
 <p:sld xmlns:a="http://schemas.openxmlformats.org/drawingml/2006/main" xmlns:r="http://schemas.openxmlformats.org/officeDocument/2006/relationships" xmlns:p="http://schemas.openxmlformats.org/presentationml/2006/main">
   <p:cSld>
@@ -7960,7 +7795,7 @@
           <a:effectLst/>
           <a:extLst>
             <a:ext uri="{909E8E84-426E-40dd-AFC4-6F175D3DCCD1}">
-              <a14:hiddenFill xmlns="" xmlns:a14="http://schemas.microsoft.com/office/drawing/2010/main">
+              <a14:hiddenFill xmlns:a14="http://schemas.microsoft.com/office/drawing/2010/main" xmlns="">
                 <a:blipFill dpi="0" rotWithShape="0">
                   <a:blip/>
                   <a:srcRect/>
@@ -7971,7 +7806,7 @@
               </a14:hiddenFill>
             </a:ext>
             <a:ext uri="{91240B29-F687-4f45-9708-019B960494DF}">
-              <a14:hiddenLine xmlns="" xmlns:a14="http://schemas.microsoft.com/office/drawing/2010/main" w="9525">
+              <a14:hiddenLine xmlns:a14="http://schemas.microsoft.com/office/drawing/2010/main" xmlns="" w="9525">
                 <a:solidFill>
                   <a:srgbClr val="000000"/>
                 </a:solidFill>
@@ -7981,7 +7816,7 @@
               </a14:hiddenLine>
             </a:ext>
             <a:ext uri="{AF507438-7753-43e0-B8FC-AC1667EBCBE1}">
-              <a14:hiddenEffects xmlns="" xmlns:a14="http://schemas.microsoft.com/office/drawing/2010/main">
+              <a14:hiddenEffects xmlns:a14="http://schemas.microsoft.com/office/drawing/2010/main" xmlns="">
                 <a:effectLst>
                   <a:outerShdw blurRad="63500" dist="38099" dir="2700000" algn="ctr" rotWithShape="0">
                     <a:srgbClr val="000000">
@@ -8080,7 +7915,7 @@
           <a:effectLst/>
           <a:extLst>
             <a:ext uri="{909E8E84-426E-40dd-AFC4-6F175D3DCCD1}">
-              <a14:hiddenFill xmlns="" xmlns:a14="http://schemas.microsoft.com/office/drawing/2010/main">
+              <a14:hiddenFill xmlns:a14="http://schemas.microsoft.com/office/drawing/2010/main" xmlns="">
                 <a:blipFill dpi="0" rotWithShape="0">
                   <a:blip/>
                   <a:srcRect/>
@@ -8091,7 +7926,7 @@
               </a14:hiddenFill>
             </a:ext>
             <a:ext uri="{91240B29-F687-4f45-9708-019B960494DF}">
-              <a14:hiddenLine xmlns="" xmlns:a14="http://schemas.microsoft.com/office/drawing/2010/main" w="9525">
+              <a14:hiddenLine xmlns:a14="http://schemas.microsoft.com/office/drawing/2010/main" xmlns="" w="9525">
                 <a:solidFill>
                   <a:srgbClr val="000000"/>
                 </a:solidFill>
@@ -8101,7 +7936,7 @@
               </a14:hiddenLine>
             </a:ext>
             <a:ext uri="{AF507438-7753-43e0-B8FC-AC1667EBCBE1}">
-              <a14:hiddenEffects xmlns="" xmlns:a14="http://schemas.microsoft.com/office/drawing/2010/main">
+              <a14:hiddenEffects xmlns:a14="http://schemas.microsoft.com/office/drawing/2010/main" xmlns="">
                 <a:effectLst>
                   <a:outerShdw blurRad="63500" dist="38099" dir="2700000" algn="ctr" rotWithShape="0">
                     <a:srgbClr val="000000">
@@ -8156,7 +7991,7 @@
           <a:effectLst/>
           <a:extLst>
             <a:ext uri="{909E8E84-426E-40dd-AFC4-6F175D3DCCD1}">
-              <a14:hiddenFill xmlns="" xmlns:a14="http://schemas.microsoft.com/office/drawing/2010/main">
+              <a14:hiddenFill xmlns:a14="http://schemas.microsoft.com/office/drawing/2010/main" xmlns="">
                 <a:blipFill dpi="0" rotWithShape="0">
                   <a:blip/>
                   <a:srcRect/>
@@ -8167,7 +8002,7 @@
               </a14:hiddenFill>
             </a:ext>
             <a:ext uri="{91240B29-F687-4f45-9708-019B960494DF}">
-              <a14:hiddenLine xmlns="" xmlns:a14="http://schemas.microsoft.com/office/drawing/2010/main" w="9525">
+              <a14:hiddenLine xmlns:a14="http://schemas.microsoft.com/office/drawing/2010/main" xmlns="" w="9525">
                 <a:solidFill>
                   <a:srgbClr val="000000"/>
                 </a:solidFill>
@@ -8177,7 +8012,7 @@
               </a14:hiddenLine>
             </a:ext>
             <a:ext uri="{AF507438-7753-43e0-B8FC-AC1667EBCBE1}">
-              <a14:hiddenEffects xmlns="" xmlns:a14="http://schemas.microsoft.com/office/drawing/2010/main">
+              <a14:hiddenEffects xmlns:a14="http://schemas.microsoft.com/office/drawing/2010/main" xmlns="">
                 <a:effectLst>
                   <a:outerShdw blurRad="63500" dist="38099" dir="2700000" algn="ctr" rotWithShape="0">
                     <a:srgbClr val="000000">
@@ -8232,7 +8067,7 @@
           <a:effectLst/>
           <a:extLst>
             <a:ext uri="{909E8E84-426E-40dd-AFC4-6F175D3DCCD1}">
-              <a14:hiddenFill xmlns="" xmlns:a14="http://schemas.microsoft.com/office/drawing/2010/main">
+              <a14:hiddenFill xmlns:a14="http://schemas.microsoft.com/office/drawing/2010/main" xmlns="">
                 <a:blipFill dpi="0" rotWithShape="0">
                   <a:blip/>
                   <a:srcRect/>
@@ -8243,7 +8078,7 @@
               </a14:hiddenFill>
             </a:ext>
             <a:ext uri="{91240B29-F687-4f45-9708-019B960494DF}">
-              <a14:hiddenLine xmlns="" xmlns:a14="http://schemas.microsoft.com/office/drawing/2010/main" w="9525">
+              <a14:hiddenLine xmlns:a14="http://schemas.microsoft.com/office/drawing/2010/main" xmlns="" w="9525">
                 <a:solidFill>
                   <a:srgbClr val="000000"/>
                 </a:solidFill>
@@ -8253,7 +8088,7 @@
               </a14:hiddenLine>
             </a:ext>
             <a:ext uri="{AF507438-7753-43e0-B8FC-AC1667EBCBE1}">
-              <a14:hiddenEffects xmlns="" xmlns:a14="http://schemas.microsoft.com/office/drawing/2010/main">
+              <a14:hiddenEffects xmlns:a14="http://schemas.microsoft.com/office/drawing/2010/main" xmlns="">
                 <a:effectLst>
                   <a:outerShdw blurRad="63500" dist="38099" dir="2700000" algn="ctr" rotWithShape="0">
                     <a:srgbClr val="000000">
@@ -8308,7 +8143,7 @@
           <a:effectLst/>
           <a:extLst>
             <a:ext uri="{909E8E84-426E-40dd-AFC4-6F175D3DCCD1}">
-              <a14:hiddenFill xmlns="" xmlns:a14="http://schemas.microsoft.com/office/drawing/2010/main">
+              <a14:hiddenFill xmlns:a14="http://schemas.microsoft.com/office/drawing/2010/main" xmlns="">
                 <a:blipFill dpi="0" rotWithShape="0">
                   <a:blip/>
                   <a:srcRect/>
@@ -8319,7 +8154,7 @@
               </a14:hiddenFill>
             </a:ext>
             <a:ext uri="{91240B29-F687-4f45-9708-019B960494DF}">
-              <a14:hiddenLine xmlns="" xmlns:a14="http://schemas.microsoft.com/office/drawing/2010/main" w="9525">
+              <a14:hiddenLine xmlns:a14="http://schemas.microsoft.com/office/drawing/2010/main" xmlns="" w="9525">
                 <a:solidFill>
                   <a:srgbClr val="000000"/>
                 </a:solidFill>
@@ -8329,7 +8164,7 @@
               </a14:hiddenLine>
             </a:ext>
             <a:ext uri="{AF507438-7753-43e0-B8FC-AC1667EBCBE1}">
-              <a14:hiddenEffects xmlns="" xmlns:a14="http://schemas.microsoft.com/office/drawing/2010/main">
+              <a14:hiddenEffects xmlns:a14="http://schemas.microsoft.com/office/drawing/2010/main" xmlns="">
                 <a:effectLst>
                   <a:outerShdw blurRad="63500" dist="38099" dir="2700000" algn="ctr" rotWithShape="0">
                     <a:srgbClr val="000000">
@@ -8891,7 +8726,7 @@
           <a:effectLst/>
           <a:extLst>
             <a:ext uri="{909E8E84-426E-40dd-AFC4-6F175D3DCCD1}">
-              <a14:hiddenFill xmlns="" xmlns:a14="http://schemas.microsoft.com/office/drawing/2010/main">
+              <a14:hiddenFill xmlns:a14="http://schemas.microsoft.com/office/drawing/2010/main" xmlns="">
                 <a:blipFill dpi="0" rotWithShape="0">
                   <a:blip/>
                   <a:srcRect/>
@@ -8902,7 +8737,7 @@
               </a14:hiddenFill>
             </a:ext>
             <a:ext uri="{91240B29-F687-4f45-9708-019B960494DF}">
-              <a14:hiddenLine xmlns="" xmlns:a14="http://schemas.microsoft.com/office/drawing/2010/main" w="9525">
+              <a14:hiddenLine xmlns:a14="http://schemas.microsoft.com/office/drawing/2010/main" xmlns="" w="9525">
                 <a:solidFill>
                   <a:srgbClr val="000000"/>
                 </a:solidFill>
@@ -8912,7 +8747,7 @@
               </a14:hiddenLine>
             </a:ext>
             <a:ext uri="{AF507438-7753-43e0-B8FC-AC1667EBCBE1}">
-              <a14:hiddenEffects xmlns="" xmlns:a14="http://schemas.microsoft.com/office/drawing/2010/main">
+              <a14:hiddenEffects xmlns:a14="http://schemas.microsoft.com/office/drawing/2010/main" xmlns="">
                 <a:effectLst>
                   <a:outerShdw blurRad="63500" dist="38099" dir="2700000" algn="ctr" rotWithShape="0">
                     <a:srgbClr val="000000">
@@ -8967,7 +8802,7 @@
           <a:effectLst/>
           <a:extLst>
             <a:ext uri="{909E8E84-426E-40dd-AFC4-6F175D3DCCD1}">
-              <a14:hiddenFill xmlns="" xmlns:a14="http://schemas.microsoft.com/office/drawing/2010/main">
+              <a14:hiddenFill xmlns:a14="http://schemas.microsoft.com/office/drawing/2010/main" xmlns="">
                 <a:blipFill dpi="0" rotWithShape="0">
                   <a:blip/>
                   <a:srcRect/>
@@ -8978,7 +8813,7 @@
               </a14:hiddenFill>
             </a:ext>
             <a:ext uri="{91240B29-F687-4f45-9708-019B960494DF}">
-              <a14:hiddenLine xmlns="" xmlns:a14="http://schemas.microsoft.com/office/drawing/2010/main" w="9525">
+              <a14:hiddenLine xmlns:a14="http://schemas.microsoft.com/office/drawing/2010/main" xmlns="" w="9525">
                 <a:solidFill>
                   <a:srgbClr val="000000"/>
                 </a:solidFill>
@@ -8988,7 +8823,7 @@
               </a14:hiddenLine>
             </a:ext>
             <a:ext uri="{AF507438-7753-43e0-B8FC-AC1667EBCBE1}">
-              <a14:hiddenEffects xmlns="" xmlns:a14="http://schemas.microsoft.com/office/drawing/2010/main">
+              <a14:hiddenEffects xmlns:a14="http://schemas.microsoft.com/office/drawing/2010/main" xmlns="">
                 <a:effectLst>
                   <a:outerShdw blurRad="63500" dist="38099" dir="2700000" algn="ctr" rotWithShape="0">
                     <a:srgbClr val="000000">
@@ -9043,7 +8878,7 @@
           <a:effectLst/>
           <a:extLst>
             <a:ext uri="{909E8E84-426E-40dd-AFC4-6F175D3DCCD1}">
-              <a14:hiddenFill xmlns="" xmlns:a14="http://schemas.microsoft.com/office/drawing/2010/main">
+              <a14:hiddenFill xmlns:a14="http://schemas.microsoft.com/office/drawing/2010/main" xmlns="">
                 <a:blipFill dpi="0" rotWithShape="0">
                   <a:blip/>
                   <a:srcRect/>
@@ -9054,7 +8889,7 @@
               </a14:hiddenFill>
             </a:ext>
             <a:ext uri="{91240B29-F687-4f45-9708-019B960494DF}">
-              <a14:hiddenLine xmlns="" xmlns:a14="http://schemas.microsoft.com/office/drawing/2010/main" w="9525">
+              <a14:hiddenLine xmlns:a14="http://schemas.microsoft.com/office/drawing/2010/main" xmlns="" w="9525">
                 <a:solidFill>
                   <a:srgbClr val="000000"/>
                 </a:solidFill>
@@ -9064,7 +8899,7 @@
               </a14:hiddenLine>
             </a:ext>
             <a:ext uri="{AF507438-7753-43e0-B8FC-AC1667EBCBE1}">
-              <a14:hiddenEffects xmlns="" xmlns:a14="http://schemas.microsoft.com/office/drawing/2010/main">
+              <a14:hiddenEffects xmlns:a14="http://schemas.microsoft.com/office/drawing/2010/main" xmlns="">
                 <a:effectLst>
                   <a:outerShdw blurRad="63500" dist="38099" dir="2700000" algn="ctr" rotWithShape="0">
                     <a:srgbClr val="000000">
@@ -10213,6 +10048,483 @@
   <p:cSld>
     <p:spTree>
       <p:nvGrpSpPr>
+        <p:cNvPr id="1" name=""/>
+        <p:cNvGrpSpPr/>
+        <p:nvPr/>
+      </p:nvGrpSpPr>
+      <p:grpSpPr>
+        <a:xfrm>
+          <a:off x="0" y="0"/>
+          <a:ext cx="0" cy="0"/>
+          <a:chOff x="0" y="0"/>
+          <a:chExt cx="0" cy="0"/>
+        </a:xfrm>
+      </p:grpSpPr>
+      <p:pic>
+        <p:nvPicPr>
+          <p:cNvPr id="7" name="Picture 6" descr="A diagram of a proposal&#10;&#10;AI-generated content may be incorrect.">
+            <a:extLst>
+              <a:ext uri="{FF2B5EF4-FFF2-40B4-BE49-F238E27FC236}">
+                <a16:creationId xmlns:a16="http://schemas.microsoft.com/office/drawing/2014/main" id="{4A60ED62-A002-A777-BDBC-3AB629647BC7}"/>
+              </a:ext>
+            </a:extLst>
+          </p:cNvPr>
+          <p:cNvPicPr>
+            <a:picLocks noChangeAspect="1"/>
+          </p:cNvPicPr>
+          <p:nvPr/>
+        </p:nvPicPr>
+        <p:blipFill>
+          <a:blip r:embed="rId2"/>
+          <a:stretch>
+            <a:fillRect/>
+          </a:stretch>
+        </p:blipFill>
+        <p:spPr>
+          <a:xfrm>
+            <a:off x="5109061" y="3281830"/>
+            <a:ext cx="6963909" cy="3420053"/>
+          </a:xfrm>
+          <a:prstGeom prst="rect">
+            <a:avLst/>
+          </a:prstGeom>
+        </p:spPr>
+      </p:pic>
+      <p:sp>
+        <p:nvSpPr>
+          <p:cNvPr id="2" name="Title 1">
+            <a:extLst>
+              <a:ext uri="{FF2B5EF4-FFF2-40B4-BE49-F238E27FC236}">
+                <a16:creationId xmlns:a16="http://schemas.microsoft.com/office/drawing/2014/main" id="{BE1AE74B-BF4B-EBBA-5E40-75313B765210}"/>
+              </a:ext>
+            </a:extLst>
+          </p:cNvPr>
+          <p:cNvSpPr>
+            <a:spLocks noGrp="1"/>
+          </p:cNvSpPr>
+          <p:nvPr>
+            <p:ph type="title"/>
+          </p:nvPr>
+        </p:nvSpPr>
+        <p:spPr/>
+        <p:txBody>
+          <a:bodyPr/>
+          <a:lstStyle/>
+          <a:p>
+            <a:r>
+              <a:rPr lang="en-US" dirty="0"/>
+              <a:t>Improvements and Considerations</a:t>
+            </a:r>
+          </a:p>
+        </p:txBody>
+      </p:sp>
+      <p:sp>
+        <p:nvSpPr>
+          <p:cNvPr id="3" name="Content Placeholder 2">
+            <a:extLst>
+              <a:ext uri="{FF2B5EF4-FFF2-40B4-BE49-F238E27FC236}">
+                <a16:creationId xmlns:a16="http://schemas.microsoft.com/office/drawing/2014/main" id="{07E9B90B-F86E-BA4E-0B80-15BF5FBD4C3A}"/>
+              </a:ext>
+            </a:extLst>
+          </p:cNvPr>
+          <p:cNvSpPr>
+            <a:spLocks noGrp="1"/>
+          </p:cNvSpPr>
+          <p:nvPr>
+            <p:ph idx="1"/>
+          </p:nvPr>
+        </p:nvSpPr>
+        <p:spPr>
+          <a:xfrm>
+            <a:off x="838200" y="1572322"/>
+            <a:ext cx="10515600" cy="5129561"/>
+          </a:xfrm>
+        </p:spPr>
+        <p:txBody>
+          <a:bodyPr>
+            <a:normAutofit/>
+          </a:bodyPr>
+          <a:lstStyle/>
+          <a:p>
+            <a:r>
+              <a:rPr lang="en-US" dirty="0">
+                <a:solidFill>
+                  <a:srgbClr val="C00000"/>
+                </a:solidFill>
+              </a:rPr>
+              <a:t>Agreeing on multiple values and ordering</a:t>
+            </a:r>
+          </a:p>
+          <a:p>
+            <a:r>
+              <a:rPr lang="en-US" dirty="0"/>
+              <a:t>e.g., multi-</a:t>
+            </a:r>
+            <a:r>
+              <a:rPr lang="en-US" dirty="0" err="1"/>
+              <a:t>paxos</a:t>
+            </a:r>
+            <a:r>
+              <a:rPr lang="en-US" dirty="0"/>
+              <a:t>: Elect a distinguished node (leader)</a:t>
+            </a:r>
+          </a:p>
+          <a:p>
+            <a:r>
+              <a:rPr lang="en-US" dirty="0"/>
+              <a:t>only execute phase 2 afterwards until failure</a:t>
+            </a:r>
+          </a:p>
+          <a:p>
+            <a:endParaRPr lang="en-US" dirty="0"/>
+          </a:p>
+          <a:p>
+            <a:r>
+              <a:rPr lang="en-US" dirty="0"/>
+              <a:t>Other protocols</a:t>
+            </a:r>
+          </a:p>
+          <a:p>
+            <a:pPr lvl="1"/>
+            <a:r>
+              <a:rPr lang="en-US" dirty="0" err="1"/>
+              <a:t>Epaxos</a:t>
+            </a:r>
+            <a:r>
+              <a:rPr lang="en-US" dirty="0"/>
+              <a:t>, Mencius, RAFT</a:t>
+            </a:r>
+          </a:p>
+        </p:txBody>
+      </p:sp>
+    </p:spTree>
+    <p:extLst>
+      <p:ext uri="{BB962C8B-B14F-4D97-AF65-F5344CB8AC3E}">
+        <p14:creationId xmlns:p14="http://schemas.microsoft.com/office/powerpoint/2010/main" val="1258571092"/>
+      </p:ext>
+    </p:extLst>
+  </p:cSld>
+  <p:clrMapOvr>
+    <a:masterClrMapping/>
+  </p:clrMapOvr>
+  <p:timing>
+    <p:tnLst>
+      <p:par>
+        <p:cTn id="1" dur="indefinite" restart="never" nodeType="tmRoot">
+          <p:childTnLst>
+            <p:seq concurrent="1" nextAc="seek">
+              <p:cTn id="2" dur="indefinite" nodeType="mainSeq">
+                <p:childTnLst>
+                  <p:par>
+                    <p:cTn id="3" fill="hold">
+                      <p:stCondLst>
+                        <p:cond delay="indefinite"/>
+                      </p:stCondLst>
+                      <p:childTnLst>
+                        <p:par>
+                          <p:cTn id="4" fill="hold">
+                            <p:stCondLst>
+                              <p:cond delay="0"/>
+                            </p:stCondLst>
+                            <p:childTnLst>
+                              <p:par>
+                                <p:cTn id="5" presetID="1" presetClass="entr" presetSubtype="0" fill="hold" nodeType="clickEffect">
+                                  <p:stCondLst>
+                                    <p:cond delay="0"/>
+                                  </p:stCondLst>
+                                  <p:childTnLst>
+                                    <p:set>
+                                      <p:cBhvr>
+                                        <p:cTn id="6" dur="1" fill="hold">
+                                          <p:stCondLst>
+                                            <p:cond delay="0"/>
+                                          </p:stCondLst>
+                                        </p:cTn>
+                                        <p:tgtEl>
+                                          <p:spTgt spid="3">
+                                            <p:txEl>
+                                              <p:pRg st="0" end="0"/>
+                                            </p:txEl>
+                                          </p:spTgt>
+                                        </p:tgtEl>
+                                        <p:attrNameLst>
+                                          <p:attrName>style.visibility</p:attrName>
+                                        </p:attrNameLst>
+                                      </p:cBhvr>
+                                      <p:to>
+                                        <p:strVal val="visible"/>
+                                      </p:to>
+                                    </p:set>
+                                  </p:childTnLst>
+                                </p:cTn>
+                              </p:par>
+                              <p:par>
+                                <p:cTn id="7" presetID="1" presetClass="entr" presetSubtype="0" fill="hold" nodeType="withEffect">
+                                  <p:stCondLst>
+                                    <p:cond delay="0"/>
+                                  </p:stCondLst>
+                                  <p:childTnLst>
+                                    <p:set>
+                                      <p:cBhvr>
+                                        <p:cTn id="8" dur="1" fill="hold">
+                                          <p:stCondLst>
+                                            <p:cond delay="0"/>
+                                          </p:stCondLst>
+                                        </p:cTn>
+                                        <p:tgtEl>
+                                          <p:spTgt spid="3">
+                                            <p:txEl>
+                                              <p:pRg st="1" end="1"/>
+                                            </p:txEl>
+                                          </p:spTgt>
+                                        </p:tgtEl>
+                                        <p:attrNameLst>
+                                          <p:attrName>style.visibility</p:attrName>
+                                        </p:attrNameLst>
+                                      </p:cBhvr>
+                                      <p:to>
+                                        <p:strVal val="visible"/>
+                                      </p:to>
+                                    </p:set>
+                                  </p:childTnLst>
+                                </p:cTn>
+                              </p:par>
+                            </p:childTnLst>
+                          </p:cTn>
+                        </p:par>
+                      </p:childTnLst>
+                    </p:cTn>
+                  </p:par>
+                  <p:par>
+                    <p:cTn id="9" fill="hold">
+                      <p:stCondLst>
+                        <p:cond delay="indefinite"/>
+                      </p:stCondLst>
+                      <p:childTnLst>
+                        <p:par>
+                          <p:cTn id="10" fill="hold">
+                            <p:stCondLst>
+                              <p:cond delay="0"/>
+                            </p:stCondLst>
+                            <p:childTnLst>
+                              <p:par>
+                                <p:cTn id="11" presetID="9" presetClass="entr" presetSubtype="0" fill="hold" nodeType="clickEffect">
+                                  <p:stCondLst>
+                                    <p:cond delay="0"/>
+                                  </p:stCondLst>
+                                  <p:childTnLst>
+                                    <p:set>
+                                      <p:cBhvr>
+                                        <p:cTn id="12" dur="1" fill="hold">
+                                          <p:stCondLst>
+                                            <p:cond delay="0"/>
+                                          </p:stCondLst>
+                                        </p:cTn>
+                                        <p:tgtEl>
+                                          <p:spTgt spid="7"/>
+                                        </p:tgtEl>
+                                        <p:attrNameLst>
+                                          <p:attrName>style.visibility</p:attrName>
+                                        </p:attrNameLst>
+                                      </p:cBhvr>
+                                      <p:to>
+                                        <p:strVal val="visible"/>
+                                      </p:to>
+                                    </p:set>
+                                    <p:animEffect transition="in" filter="dissolve">
+                                      <p:cBhvr>
+                                        <p:cTn id="13" dur="500"/>
+                                        <p:tgtEl>
+                                          <p:spTgt spid="7"/>
+                                        </p:tgtEl>
+                                      </p:cBhvr>
+                                    </p:animEffect>
+                                  </p:childTnLst>
+                                </p:cTn>
+                              </p:par>
+                            </p:childTnLst>
+                          </p:cTn>
+                        </p:par>
+                      </p:childTnLst>
+                    </p:cTn>
+                  </p:par>
+                  <p:par>
+                    <p:cTn id="14" fill="hold">
+                      <p:stCondLst>
+                        <p:cond delay="indefinite"/>
+                      </p:stCondLst>
+                      <p:childTnLst>
+                        <p:par>
+                          <p:cTn id="15" fill="hold">
+                            <p:stCondLst>
+                              <p:cond delay="0"/>
+                            </p:stCondLst>
+                            <p:childTnLst>
+                              <p:par>
+                                <p:cTn id="16" presetID="1" presetClass="entr" presetSubtype="0" fill="hold" nodeType="clickEffect">
+                                  <p:stCondLst>
+                                    <p:cond delay="0"/>
+                                  </p:stCondLst>
+                                  <p:childTnLst>
+                                    <p:set>
+                                      <p:cBhvr>
+                                        <p:cTn id="17" dur="1" fill="hold">
+                                          <p:stCondLst>
+                                            <p:cond delay="0"/>
+                                          </p:stCondLst>
+                                        </p:cTn>
+                                        <p:tgtEl>
+                                          <p:spTgt spid="3">
+                                            <p:txEl>
+                                              <p:pRg st="2" end="2"/>
+                                            </p:txEl>
+                                          </p:spTgt>
+                                        </p:tgtEl>
+                                        <p:attrNameLst>
+                                          <p:attrName>style.visibility</p:attrName>
+                                        </p:attrNameLst>
+                                      </p:cBhvr>
+                                      <p:to>
+                                        <p:strVal val="visible"/>
+                                      </p:to>
+                                    </p:set>
+                                  </p:childTnLst>
+                                </p:cTn>
+                              </p:par>
+                            </p:childTnLst>
+                          </p:cTn>
+                        </p:par>
+                      </p:childTnLst>
+                    </p:cTn>
+                  </p:par>
+                  <p:par>
+                    <p:cTn id="18" fill="hold">
+                      <p:stCondLst>
+                        <p:cond delay="indefinite"/>
+                      </p:stCondLst>
+                      <p:childTnLst>
+                        <p:par>
+                          <p:cTn id="19" fill="hold">
+                            <p:stCondLst>
+                              <p:cond delay="0"/>
+                            </p:stCondLst>
+                            <p:childTnLst>
+                              <p:par>
+                                <p:cTn id="20" presetID="1" presetClass="entr" presetSubtype="0" fill="hold" nodeType="clickEffect">
+                                  <p:stCondLst>
+                                    <p:cond delay="0"/>
+                                  </p:stCondLst>
+                                  <p:childTnLst>
+                                    <p:set>
+                                      <p:cBhvr>
+                                        <p:cTn id="21" dur="1" fill="hold">
+                                          <p:stCondLst>
+                                            <p:cond delay="0"/>
+                                          </p:stCondLst>
+                                        </p:cTn>
+                                        <p:tgtEl>
+                                          <p:spTgt spid="3">
+                                            <p:txEl>
+                                              <p:pRg st="4" end="4"/>
+                                            </p:txEl>
+                                          </p:spTgt>
+                                        </p:tgtEl>
+                                        <p:attrNameLst>
+                                          <p:attrName>style.visibility</p:attrName>
+                                        </p:attrNameLst>
+                                      </p:cBhvr>
+                                      <p:to>
+                                        <p:strVal val="visible"/>
+                                      </p:to>
+                                    </p:set>
+                                  </p:childTnLst>
+                                </p:cTn>
+                              </p:par>
+                            </p:childTnLst>
+                          </p:cTn>
+                        </p:par>
+                      </p:childTnLst>
+                    </p:cTn>
+                  </p:par>
+                  <p:par>
+                    <p:cTn id="22" fill="hold">
+                      <p:stCondLst>
+                        <p:cond delay="indefinite"/>
+                      </p:stCondLst>
+                      <p:childTnLst>
+                        <p:par>
+                          <p:cTn id="23" fill="hold">
+                            <p:stCondLst>
+                              <p:cond delay="0"/>
+                            </p:stCondLst>
+                            <p:childTnLst>
+                              <p:par>
+                                <p:cTn id="24" presetID="1" presetClass="entr" presetSubtype="0" fill="hold" nodeType="clickEffect">
+                                  <p:stCondLst>
+                                    <p:cond delay="0"/>
+                                  </p:stCondLst>
+                                  <p:childTnLst>
+                                    <p:set>
+                                      <p:cBhvr>
+                                        <p:cTn id="25" dur="1" fill="hold">
+                                          <p:stCondLst>
+                                            <p:cond delay="0"/>
+                                          </p:stCondLst>
+                                        </p:cTn>
+                                        <p:tgtEl>
+                                          <p:spTgt spid="3">
+                                            <p:txEl>
+                                              <p:pRg st="5" end="5"/>
+                                            </p:txEl>
+                                          </p:spTgt>
+                                        </p:tgtEl>
+                                        <p:attrNameLst>
+                                          <p:attrName>style.visibility</p:attrName>
+                                        </p:attrNameLst>
+                                      </p:cBhvr>
+                                      <p:to>
+                                        <p:strVal val="visible"/>
+                                      </p:to>
+                                    </p:set>
+                                  </p:childTnLst>
+                                </p:cTn>
+                              </p:par>
+                            </p:childTnLst>
+                          </p:cTn>
+                        </p:par>
+                      </p:childTnLst>
+                    </p:cTn>
+                  </p:par>
+                </p:childTnLst>
+              </p:cTn>
+              <p:prevCondLst>
+                <p:cond evt="onPrev" delay="0">
+                  <p:tgtEl>
+                    <p:sldTgt/>
+                  </p:tgtEl>
+                </p:cond>
+              </p:prevCondLst>
+              <p:nextCondLst>
+                <p:cond evt="onNext" delay="0">
+                  <p:tgtEl>
+                    <p:sldTgt/>
+                  </p:tgtEl>
+                </p:cond>
+              </p:nextCondLst>
+            </p:seq>
+          </p:childTnLst>
+        </p:cTn>
+      </p:par>
+    </p:tnLst>
+  </p:timing>
+</p:sld>
+</file>
+
+<file path=ppt/slides/slide21.xml><?xml version="1.0" encoding="utf-8"?>
+<p:sld xmlns:a="http://schemas.openxmlformats.org/drawingml/2006/main" xmlns:r="http://schemas.openxmlformats.org/officeDocument/2006/relationships" xmlns:p="http://schemas.openxmlformats.org/presentationml/2006/main">
+  <p:cSld>
+    <p:spTree>
+      <p:nvGrpSpPr>
         <p:cNvPr id="1" name="">
           <a:extLst>
             <a:ext uri="{FF2B5EF4-FFF2-40B4-BE49-F238E27FC236}">
@@ -10651,7 +10963,7 @@
         </p:spPr>
         <p:txBody>
           <a:bodyPr>
-            <a:normAutofit lnSpcReduction="10000"/>
+            <a:normAutofit/>
           </a:bodyPr>
           <a:lstStyle/>
           <a:p>
@@ -10692,6 +11004,44 @@
           </a:p>
           <a:p>
             <a:r>
+              <a:rPr lang="en-US" dirty="0"/>
+              <a:t>One option: weak consistency models</a:t>
+            </a:r>
+          </a:p>
+          <a:p>
+            <a:pPr lvl="1"/>
+            <a:r>
+              <a:rPr lang="en-US" dirty="0"/>
+              <a:t>Example: eventually consistent</a:t>
+            </a:r>
+          </a:p>
+          <a:p>
+            <a:pPr lvl="1"/>
+            <a:r>
+              <a:rPr lang="en-US" dirty="0"/>
+              <a:t>Complex mental models: e.g., read, write, read</a:t>
+            </a:r>
+          </a:p>
+          <a:p>
+            <a:pPr lvl="1"/>
+            <a:r>
+              <a:rPr lang="en-US" dirty="0"/>
+              <a:t>Some data is too critical to be out of sync, e.g., Kubernetes cluster state</a:t>
+            </a:r>
+          </a:p>
+          <a:p>
+            <a:pPr lvl="1"/>
+            <a:r>
+              <a:rPr lang="en-US" dirty="0"/>
+              <a:t>Don’t sacrifice correctness at any point, e.g., financial systems</a:t>
+            </a:r>
+          </a:p>
+          <a:p>
+            <a:pPr lvl="1"/>
+            <a:endParaRPr lang="en-US" dirty="0"/>
+          </a:p>
+          <a:p>
+            <a:r>
               <a:rPr lang="en-US" dirty="0">
                 <a:solidFill>
                   <a:srgbClr val="C00000"/>
@@ -10705,66 +11055,14 @@
             </a:r>
           </a:p>
           <a:p>
+            <a:pPr lvl="1"/>
             <a:r>
               <a:rPr lang="en-US" dirty="0"/>
-              <a:t>Why not weaker consistency models? e.g., eventually consistent</a:t>
-            </a:r>
-          </a:p>
-          <a:p>
-            <a:pPr lvl="1"/>
-            <a:r>
-              <a:rPr lang="en-US" dirty="0"/>
-              <a:t>Complex mental models: e.g., read, write, read</a:t>
-            </a:r>
-          </a:p>
-          <a:p>
-            <a:pPr lvl="1"/>
-            <a:r>
-              <a:rPr lang="en-US" dirty="0"/>
-              <a:t>Some data is too critical to be out of sync, e.g., Kubernetes cluster state</a:t>
-            </a:r>
-          </a:p>
-          <a:p>
-            <a:pPr lvl="1"/>
-            <a:r>
-              <a:rPr lang="en-US" dirty="0"/>
-              <a:t>Don’t sacrifice correctness at any point, e.g., financial systems</a:t>
-            </a:r>
-          </a:p>
-          <a:p>
-            <a:r>
-              <a:rPr lang="en-US" dirty="0">
-                <a:solidFill>
-                  <a:srgbClr val="C00000"/>
-                </a:solidFill>
-              </a:rPr>
-              <a:t>CAP theorem:</a:t>
-            </a:r>
-          </a:p>
-          <a:p>
-            <a:pPr lvl="1"/>
-            <a:r>
-              <a:rPr lang="en-US" dirty="0">
-                <a:solidFill>
-                  <a:srgbClr val="C00000"/>
-                </a:solidFill>
-              </a:rPr>
-              <a:t>(strong) consistency, availability, partition tolerance: pick 2</a:t>
-            </a:r>
-          </a:p>
-          <a:p>
-            <a:pPr lvl="1"/>
-            <a:r>
-              <a:rPr lang="en-US" dirty="0"/>
-              <a:t>You really can’t choose CA in a practical system. Network partitions will happen; you must design systems to tolerate them</a:t>
-            </a:r>
-          </a:p>
-          <a:p>
-            <a:pPr lvl="1"/>
-            <a:r>
-              <a:rPr lang="en-US" dirty="0"/>
-              <a:t>Result: give up either strong consistency or availability</a:t>
-            </a:r>
+              <a:t>Operations ordered globally; each read returns the result of the latest write</a:t>
+            </a:r>
+          </a:p>
+          <a:p>
+            <a:endParaRPr lang="en-US" dirty="0"/>
           </a:p>
           <a:p>
             <a:endParaRPr lang="en-US" dirty="0"/>
@@ -10816,7 +11114,7 @@
           <a:effectLst/>
           <a:extLst>
             <a:ext uri="{909E8E84-426E-40dd-AFC4-6F175D3DCCD1}">
-              <a14:hiddenFill xmlns:a14="http://schemas.microsoft.com/office/drawing/2010/main" xmlns="">
+              <a14:hiddenFill xmlns="" xmlns:a14="http://schemas.microsoft.com/office/drawing/2010/main">
                 <a:blipFill dpi="0" rotWithShape="0">
                   <a:blip/>
                   <a:srcRect/>
@@ -10827,7 +11125,7 @@
               </a14:hiddenFill>
             </a:ext>
             <a:ext uri="{91240B29-F687-4f45-9708-019B960494DF}">
-              <a14:hiddenLine xmlns:a14="http://schemas.microsoft.com/office/drawing/2010/main" xmlns="" w="9525">
+              <a14:hiddenLine xmlns="" xmlns:a14="http://schemas.microsoft.com/office/drawing/2010/main" w="9525">
                 <a:solidFill>
                   <a:srgbClr val="000000"/>
                 </a:solidFill>
@@ -10837,7 +11135,7 @@
               </a14:hiddenLine>
             </a:ext>
             <a:ext uri="{AF507438-7753-43e0-B8FC-AC1667EBCBE1}">
-              <a14:hiddenEffects xmlns:a14="http://schemas.microsoft.com/office/drawing/2010/main" xmlns="">
+              <a14:hiddenEffects xmlns="" xmlns:a14="http://schemas.microsoft.com/office/drawing/2010/main">
                 <a:effectLst>
                   <a:outerShdw blurRad="63500" dist="38099" dir="2700000" algn="ctr" rotWithShape="0">
                     <a:srgbClr val="000000">
@@ -10892,7 +11190,7 @@
           <a:effectLst/>
           <a:extLst>
             <a:ext uri="{909E8E84-426E-40dd-AFC4-6F175D3DCCD1}">
-              <a14:hiddenFill xmlns:a14="http://schemas.microsoft.com/office/drawing/2010/main" xmlns="">
+              <a14:hiddenFill xmlns="" xmlns:a14="http://schemas.microsoft.com/office/drawing/2010/main">
                 <a:blipFill dpi="0" rotWithShape="0">
                   <a:blip/>
                   <a:srcRect/>
@@ -10903,7 +11201,7 @@
               </a14:hiddenFill>
             </a:ext>
             <a:ext uri="{91240B29-F687-4f45-9708-019B960494DF}">
-              <a14:hiddenLine xmlns:a14="http://schemas.microsoft.com/office/drawing/2010/main" xmlns="" w="9525">
+              <a14:hiddenLine xmlns="" xmlns:a14="http://schemas.microsoft.com/office/drawing/2010/main" w="9525">
                 <a:solidFill>
                   <a:srgbClr val="000000"/>
                 </a:solidFill>
@@ -10913,7 +11211,7 @@
               </a14:hiddenLine>
             </a:ext>
             <a:ext uri="{AF507438-7753-43e0-B8FC-AC1667EBCBE1}">
-              <a14:hiddenEffects xmlns:a14="http://schemas.microsoft.com/office/drawing/2010/main" xmlns="">
+              <a14:hiddenEffects xmlns="" xmlns:a14="http://schemas.microsoft.com/office/drawing/2010/main">
                 <a:effectLst>
                   <a:outerShdw blurRad="63500" dist="38099" dir="2700000" algn="ctr" rotWithShape="0">
                     <a:srgbClr val="000000">
@@ -10968,7 +11266,7 @@
           <a:effectLst/>
           <a:extLst>
             <a:ext uri="{909E8E84-426E-40dd-AFC4-6F175D3DCCD1}">
-              <a14:hiddenFill xmlns:a14="http://schemas.microsoft.com/office/drawing/2010/main" xmlns="">
+              <a14:hiddenFill xmlns="" xmlns:a14="http://schemas.microsoft.com/office/drawing/2010/main">
                 <a:blipFill dpi="0" rotWithShape="0">
                   <a:blip/>
                   <a:srcRect/>
@@ -10979,7 +11277,7 @@
               </a14:hiddenFill>
             </a:ext>
             <a:ext uri="{91240B29-F687-4f45-9708-019B960494DF}">
-              <a14:hiddenLine xmlns:a14="http://schemas.microsoft.com/office/drawing/2010/main" xmlns="" w="9525">
+              <a14:hiddenLine xmlns="" xmlns:a14="http://schemas.microsoft.com/office/drawing/2010/main" w="9525">
                 <a:solidFill>
                   <a:srgbClr val="000000"/>
                 </a:solidFill>
@@ -10989,7 +11287,7 @@
               </a14:hiddenLine>
             </a:ext>
             <a:ext uri="{AF507438-7753-43e0-B8FC-AC1667EBCBE1}">
-              <a14:hiddenEffects xmlns:a14="http://schemas.microsoft.com/office/drawing/2010/main" xmlns="">
+              <a14:hiddenEffects xmlns="" xmlns:a14="http://schemas.microsoft.com/office/drawing/2010/main">
                 <a:effectLst>
                   <a:outerShdw blurRad="63500" dist="38099" dir="2700000" algn="ctr" rotWithShape="0">
                     <a:srgbClr val="000000">
@@ -11044,7 +11342,7 @@
           <a:effectLst/>
           <a:extLst>
             <a:ext uri="{909E8E84-426E-40dd-AFC4-6F175D3DCCD1}">
-              <a14:hiddenFill xmlns:a14="http://schemas.microsoft.com/office/drawing/2010/main" xmlns="">
+              <a14:hiddenFill xmlns="" xmlns:a14="http://schemas.microsoft.com/office/drawing/2010/main">
                 <a:blipFill dpi="0" rotWithShape="0">
                   <a:blip/>
                   <a:srcRect/>
@@ -11055,7 +11353,7 @@
               </a14:hiddenFill>
             </a:ext>
             <a:ext uri="{91240B29-F687-4f45-9708-019B960494DF}">
-              <a14:hiddenLine xmlns:a14="http://schemas.microsoft.com/office/drawing/2010/main" xmlns="" w="9525">
+              <a14:hiddenLine xmlns="" xmlns:a14="http://schemas.microsoft.com/office/drawing/2010/main" w="9525">
                 <a:solidFill>
                   <a:srgbClr val="000000"/>
                 </a:solidFill>
@@ -11065,7 +11363,7 @@
               </a14:hiddenLine>
             </a:ext>
             <a:ext uri="{AF507438-7753-43e0-B8FC-AC1667EBCBE1}">
-              <a14:hiddenEffects xmlns:a14="http://schemas.microsoft.com/office/drawing/2010/main" xmlns="">
+              <a14:hiddenEffects xmlns="" xmlns:a14="http://schemas.microsoft.com/office/drawing/2010/main">
                 <a:effectLst>
                   <a:outerShdw blurRad="63500" dist="38099" dir="2700000" algn="ctr" rotWithShape="0">
                     <a:srgbClr val="000000">
@@ -11188,7 +11486,7 @@
           <a:effectLst/>
           <a:extLst>
             <a:ext uri="{909E8E84-426E-40dd-AFC4-6F175D3DCCD1}">
-              <a14:hiddenFill xmlns:a14="http://schemas.microsoft.com/office/drawing/2010/main" xmlns="">
+              <a14:hiddenFill xmlns="" xmlns:a14="http://schemas.microsoft.com/office/drawing/2010/main">
                 <a:blipFill dpi="0" rotWithShape="0">
                   <a:blip/>
                   <a:srcRect/>
@@ -11199,7 +11497,7 @@
               </a14:hiddenFill>
             </a:ext>
             <a:ext uri="{91240B29-F687-4f45-9708-019B960494DF}">
-              <a14:hiddenLine xmlns:a14="http://schemas.microsoft.com/office/drawing/2010/main" xmlns="" w="9525">
+              <a14:hiddenLine xmlns="" xmlns:a14="http://schemas.microsoft.com/office/drawing/2010/main" w="9525">
                 <a:solidFill>
                   <a:srgbClr val="000000"/>
                 </a:solidFill>
@@ -11209,7 +11507,7 @@
               </a14:hiddenLine>
             </a:ext>
             <a:ext uri="{AF507438-7753-43e0-B8FC-AC1667EBCBE1}">
-              <a14:hiddenEffects xmlns:a14="http://schemas.microsoft.com/office/drawing/2010/main" xmlns="">
+              <a14:hiddenEffects xmlns="" xmlns:a14="http://schemas.microsoft.com/office/drawing/2010/main">
                 <a:effectLst>
                   <a:outerShdw blurRad="63500" dist="38099" dir="2700000" algn="ctr" rotWithShape="0">
                     <a:srgbClr val="000000">
@@ -11264,7 +11562,7 @@
           <a:effectLst/>
           <a:extLst>
             <a:ext uri="{909E8E84-426E-40dd-AFC4-6F175D3DCCD1}">
-              <a14:hiddenFill xmlns:a14="http://schemas.microsoft.com/office/drawing/2010/main" xmlns="">
+              <a14:hiddenFill xmlns="" xmlns:a14="http://schemas.microsoft.com/office/drawing/2010/main">
                 <a:blipFill dpi="0" rotWithShape="0">
                   <a:blip/>
                   <a:srcRect/>
@@ -11275,7 +11573,7 @@
               </a14:hiddenFill>
             </a:ext>
             <a:ext uri="{91240B29-F687-4f45-9708-019B960494DF}">
-              <a14:hiddenLine xmlns:a14="http://schemas.microsoft.com/office/drawing/2010/main" xmlns="" w="9525">
+              <a14:hiddenLine xmlns="" xmlns:a14="http://schemas.microsoft.com/office/drawing/2010/main" w="9525">
                 <a:solidFill>
                   <a:srgbClr val="000000"/>
                 </a:solidFill>
@@ -11285,7 +11583,7 @@
               </a14:hiddenLine>
             </a:ext>
             <a:ext uri="{AF507438-7753-43e0-B8FC-AC1667EBCBE1}">
-              <a14:hiddenEffects xmlns:a14="http://schemas.microsoft.com/office/drawing/2010/main" xmlns="">
+              <a14:hiddenEffects xmlns="" xmlns:a14="http://schemas.microsoft.com/office/drawing/2010/main">
                 <a:effectLst>
                   <a:outerShdw blurRad="63500" dist="38099" dir="2700000" algn="ctr" rotWithShape="0">
                     <a:srgbClr val="000000">
@@ -11939,7 +12237,7 @@
                                         <p:tgtEl>
                                           <p:spTgt spid="3">
                                             <p:txEl>
-                                              <p:pRg st="7" end="7"/>
+                                              <p:pRg st="8" end="8"/>
                                             </p:txEl>
                                           </p:spTgt>
                                         </p:tgtEl>
@@ -11988,105 +12286,7 @@
                                         <p:tgtEl>
                                           <p:spTgt spid="3">
                                             <p:txEl>
-                                              <p:pRg st="8" end="8"/>
-                                            </p:txEl>
-                                          </p:spTgt>
-                                        </p:tgtEl>
-                                        <p:attrNameLst>
-                                          <p:attrName>style.visibility</p:attrName>
-                                        </p:attrNameLst>
-                                      </p:cBhvr>
-                                      <p:to>
-                                        <p:strVal val="visible"/>
-                                      </p:to>
-                                    </p:set>
-                                  </p:childTnLst>
-                                </p:cTn>
-                              </p:par>
-                            </p:childTnLst>
-                          </p:cTn>
-                        </p:par>
-                      </p:childTnLst>
-                    </p:cTn>
-                  </p:par>
-                  <p:par>
-                    <p:cTn id="59" fill="hold">
-                      <p:stCondLst>
-                        <p:cond delay="indefinite"/>
-                      </p:stCondLst>
-                      <p:childTnLst>
-                        <p:par>
-                          <p:cTn id="60" fill="hold">
-                            <p:stCondLst>
-                              <p:cond delay="0"/>
-                            </p:stCondLst>
-                            <p:childTnLst>
-                              <p:par>
-                                <p:cTn id="61" presetID="1" presetClass="entr" presetSubtype="0" fill="hold" nodeType="clickEffect">
-                                  <p:stCondLst>
-                                    <p:cond delay="0"/>
-                                  </p:stCondLst>
-                                  <p:childTnLst>
-                                    <p:set>
-                                      <p:cBhvr>
-                                        <p:cTn id="62" dur="1" fill="hold">
-                                          <p:stCondLst>
-                                            <p:cond delay="0"/>
-                                          </p:stCondLst>
-                                        </p:cTn>
-                                        <p:tgtEl>
-                                          <p:spTgt spid="3">
-                                            <p:txEl>
                                               <p:pRg st="9" end="9"/>
-                                            </p:txEl>
-                                          </p:spTgt>
-                                        </p:tgtEl>
-                                        <p:attrNameLst>
-                                          <p:attrName>style.visibility</p:attrName>
-                                        </p:attrNameLst>
-                                      </p:cBhvr>
-                                      <p:to>
-                                        <p:strVal val="visible"/>
-                                      </p:to>
-                                    </p:set>
-                                  </p:childTnLst>
-                                </p:cTn>
-                              </p:par>
-                            </p:childTnLst>
-                          </p:cTn>
-                        </p:par>
-                      </p:childTnLst>
-                    </p:cTn>
-                  </p:par>
-                  <p:par>
-                    <p:cTn id="63" fill="hold">
-                      <p:stCondLst>
-                        <p:cond delay="indefinite"/>
-                      </p:stCondLst>
-                      <p:childTnLst>
-                        <p:par>
-                          <p:cTn id="64" fill="hold">
-                            <p:stCondLst>
-                              <p:cond delay="0"/>
-                            </p:stCondLst>
-                            <p:childTnLst>
-                              <p:par>
-                                <p:cTn id="65" presetID="1" presetClass="entr" presetSubtype="0" fill="hold" nodeType="clickEffect">
-                                  <p:stCondLst>
-                                    <p:cond delay="0"/>
-                                  </p:stCondLst>
-                                  <p:childTnLst>
-                                    <p:set>
-                                      <p:cBhvr>
-                                        <p:cTn id="66" dur="1" fill="hold">
-                                          <p:stCondLst>
-                                            <p:cond delay="0"/>
-                                          </p:stCondLst>
-                                        </p:cTn>
-                                        <p:tgtEl>
-                                          <p:spTgt spid="3">
-                                            <p:txEl>
-                                              <p:pRg st="10" end="10"/>
                                             </p:txEl>
                                           </p:spTgt>
                                         </p:tgtEl>
@@ -12136,6 +12336,789 @@
 </file>
 
 <file path=ppt/slides/slide4.xml><?xml version="1.0" encoding="utf-8"?>
+<p:sld xmlns:a="http://schemas.openxmlformats.org/drawingml/2006/main" xmlns:r="http://schemas.openxmlformats.org/officeDocument/2006/relationships" xmlns:p="http://schemas.openxmlformats.org/presentationml/2006/main">
+  <p:cSld>
+    <p:spTree>
+      <p:nvGrpSpPr>
+        <p:cNvPr id="1" name=""/>
+        <p:cNvGrpSpPr/>
+        <p:nvPr/>
+      </p:nvGrpSpPr>
+      <p:grpSpPr>
+        <a:xfrm>
+          <a:off x="0" y="0"/>
+          <a:ext cx="0" cy="0"/>
+          <a:chOff x="0" y="0"/>
+          <a:chExt cx="0" cy="0"/>
+        </a:xfrm>
+      </p:grpSpPr>
+      <p:pic>
+        <p:nvPicPr>
+          <p:cNvPr id="5" name="Picture 4" descr="A group of people pulling a rope&#10;&#10;AI-generated content may be incorrect.">
+            <a:extLst>
+              <a:ext uri="{FF2B5EF4-FFF2-40B4-BE49-F238E27FC236}">
+                <a16:creationId xmlns:a16="http://schemas.microsoft.com/office/drawing/2014/main" id="{1878AE45-83F0-98DB-198C-96C94B22A266}"/>
+              </a:ext>
+            </a:extLst>
+          </p:cNvPr>
+          <p:cNvPicPr>
+            <a:picLocks noChangeAspect="1"/>
+          </p:cNvPicPr>
+          <p:nvPr/>
+        </p:nvPicPr>
+        <p:blipFill>
+          <a:blip r:embed="rId2"/>
+          <a:stretch>
+            <a:fillRect/>
+          </a:stretch>
+        </p:blipFill>
+        <p:spPr>
+          <a:xfrm>
+            <a:off x="6549390" y="77407"/>
+            <a:ext cx="3680460" cy="1748218"/>
+          </a:xfrm>
+          <a:prstGeom prst="rect">
+            <a:avLst/>
+          </a:prstGeom>
+        </p:spPr>
+      </p:pic>
+      <p:sp>
+        <p:nvSpPr>
+          <p:cNvPr id="2" name="Title 1">
+            <a:extLst>
+              <a:ext uri="{FF2B5EF4-FFF2-40B4-BE49-F238E27FC236}">
+                <a16:creationId xmlns:a16="http://schemas.microsoft.com/office/drawing/2014/main" id="{EFB51DD9-FE17-8716-2639-1BE0E2A4C9EB}"/>
+              </a:ext>
+            </a:extLst>
+          </p:cNvPr>
+          <p:cNvSpPr>
+            <a:spLocks noGrp="1"/>
+          </p:cNvSpPr>
+          <p:nvPr>
+            <p:ph type="title"/>
+          </p:nvPr>
+        </p:nvSpPr>
+        <p:spPr/>
+        <p:txBody>
+          <a:bodyPr/>
+          <a:lstStyle/>
+          <a:p>
+            <a:r>
+              <a:rPr lang="en-US" dirty="0"/>
+              <a:t>CAP Theorem</a:t>
+            </a:r>
+          </a:p>
+        </p:txBody>
+      </p:sp>
+      <p:sp>
+        <p:nvSpPr>
+          <p:cNvPr id="3" name="Content Placeholder 2">
+            <a:extLst>
+              <a:ext uri="{FF2B5EF4-FFF2-40B4-BE49-F238E27FC236}">
+                <a16:creationId xmlns:a16="http://schemas.microsoft.com/office/drawing/2014/main" id="{CE8A1977-1D35-BF2C-4038-EE24A79CD0E1}"/>
+              </a:ext>
+            </a:extLst>
+          </p:cNvPr>
+          <p:cNvSpPr>
+            <a:spLocks noGrp="1"/>
+          </p:cNvSpPr>
+          <p:nvPr>
+            <p:ph idx="1"/>
+          </p:nvPr>
+        </p:nvSpPr>
+        <p:spPr>
+          <a:xfrm>
+            <a:off x="838200" y="1825625"/>
+            <a:ext cx="10515600" cy="4667250"/>
+          </a:xfrm>
+        </p:spPr>
+        <p:txBody>
+          <a:bodyPr>
+            <a:normAutofit/>
+          </a:bodyPr>
+          <a:lstStyle/>
+          <a:p>
+            <a:r>
+              <a:rPr lang="en-US" dirty="0">
+                <a:solidFill>
+                  <a:srgbClr val="C00000"/>
+                </a:solidFill>
+              </a:rPr>
+              <a:t>(Strong) consistency</a:t>
+            </a:r>
+            <a:r>
+              <a:rPr lang="en-US" dirty="0"/>
+              <a:t>: each read receives the most recent write</a:t>
+            </a:r>
+          </a:p>
+          <a:p>
+            <a:r>
+              <a:rPr lang="en-US" dirty="0">
+                <a:solidFill>
+                  <a:srgbClr val="C00000"/>
+                </a:solidFill>
+              </a:rPr>
+              <a:t>Availability:</a:t>
+            </a:r>
+            <a:r>
+              <a:rPr lang="en-US" dirty="0"/>
+              <a:t> read to any non-failed node returns a response</a:t>
+            </a:r>
+          </a:p>
+          <a:p>
+            <a:r>
+              <a:rPr lang="en-US" dirty="0">
+                <a:solidFill>
+                  <a:srgbClr val="C00000"/>
+                </a:solidFill>
+              </a:rPr>
+              <a:t>Partition tolerance:</a:t>
+            </a:r>
+            <a:r>
+              <a:rPr lang="en-US" dirty="0"/>
+              <a:t> continue to operate despite arbitrary message failure between nodes</a:t>
+            </a:r>
+          </a:p>
+          <a:p>
+            <a:r>
+              <a:rPr lang="en-US" dirty="0"/>
+              <a:t>CAP theorem</a:t>
+            </a:r>
+            <a:r>
+              <a:rPr lang="en-US"/>
+              <a:t>: Can’t </a:t>
+            </a:r>
+            <a:r>
+              <a:rPr lang="en-US" dirty="0"/>
+              <a:t>get all three: </a:t>
+            </a:r>
+            <a:r>
+              <a:rPr lang="en-US">
+                <a:solidFill>
+                  <a:srgbClr val="C00000"/>
+                </a:solidFill>
+              </a:rPr>
+              <a:t>Pick 2</a:t>
+            </a:r>
+          </a:p>
+          <a:p>
+            <a:r>
+              <a:rPr lang="en-US"/>
+              <a:t>You </a:t>
+            </a:r>
+            <a:r>
+              <a:rPr lang="en-US" dirty="0"/>
+              <a:t>really can’t choose CA in a practical system</a:t>
+            </a:r>
+          </a:p>
+          <a:p>
+            <a:pPr lvl="1"/>
+            <a:r>
+              <a:rPr lang="en-US" dirty="0"/>
+              <a:t>Network partitions will happen; design systems to tolerate them</a:t>
+            </a:r>
+          </a:p>
+          <a:p>
+            <a:r>
+              <a:rPr lang="en-US" dirty="0"/>
+              <a:t>Result: give up either strong consistency or availability</a:t>
+            </a:r>
+          </a:p>
+          <a:p>
+            <a:endParaRPr lang="en-US" dirty="0"/>
+          </a:p>
+        </p:txBody>
+      </p:sp>
+      <p:sp>
+        <p:nvSpPr>
+          <p:cNvPr id="6" name="TextBox 5">
+            <a:extLst>
+              <a:ext uri="{FF2B5EF4-FFF2-40B4-BE49-F238E27FC236}">
+                <a16:creationId xmlns:a16="http://schemas.microsoft.com/office/drawing/2014/main" id="{89524CB2-C867-838C-3047-61DD5A32AA39}"/>
+              </a:ext>
+            </a:extLst>
+          </p:cNvPr>
+          <p:cNvSpPr txBox="1"/>
+          <p:nvPr/>
+        </p:nvSpPr>
+        <p:spPr>
+          <a:xfrm>
+            <a:off x="4880610" y="566241"/>
+            <a:ext cx="1920240" cy="461665"/>
+          </a:xfrm>
+          <a:prstGeom prst="rect">
+            <a:avLst/>
+          </a:prstGeom>
+          <a:noFill/>
+        </p:spPr>
+        <p:txBody>
+          <a:bodyPr wrap="square" rtlCol="0">
+            <a:spAutoFit/>
+          </a:bodyPr>
+          <a:lstStyle/>
+          <a:p>
+            <a:pPr algn="ctr"/>
+            <a:r>
+              <a:rPr lang="en-US" sz="2400" dirty="0">
+                <a:latin typeface="Helvetica" pitchFamily="2" charset="0"/>
+              </a:rPr>
+              <a:t>consistency</a:t>
+            </a:r>
+          </a:p>
+        </p:txBody>
+      </p:sp>
+      <p:sp>
+        <p:nvSpPr>
+          <p:cNvPr id="7" name="TextBox 6">
+            <a:extLst>
+              <a:ext uri="{FF2B5EF4-FFF2-40B4-BE49-F238E27FC236}">
+                <a16:creationId xmlns:a16="http://schemas.microsoft.com/office/drawing/2014/main" id="{4E8A6E6B-4688-58ED-3143-ED889DCF8D6C}"/>
+              </a:ext>
+            </a:extLst>
+          </p:cNvPr>
+          <p:cNvSpPr txBox="1"/>
+          <p:nvPr/>
+        </p:nvSpPr>
+        <p:spPr>
+          <a:xfrm>
+            <a:off x="10187940" y="566240"/>
+            <a:ext cx="1920240" cy="461665"/>
+          </a:xfrm>
+          <a:prstGeom prst="rect">
+            <a:avLst/>
+          </a:prstGeom>
+          <a:noFill/>
+        </p:spPr>
+        <p:txBody>
+          <a:bodyPr wrap="square" rtlCol="0">
+            <a:spAutoFit/>
+          </a:bodyPr>
+          <a:lstStyle/>
+          <a:p>
+            <a:pPr algn="ctr"/>
+            <a:r>
+              <a:rPr lang="en-US" sz="2400" dirty="0">
+                <a:latin typeface="Helvetica" pitchFamily="2" charset="0"/>
+              </a:rPr>
+              <a:t>availability</a:t>
+            </a:r>
+          </a:p>
+        </p:txBody>
+      </p:sp>
+    </p:spTree>
+    <p:extLst>
+      <p:ext uri="{BB962C8B-B14F-4D97-AF65-F5344CB8AC3E}">
+        <p14:creationId xmlns:p14="http://schemas.microsoft.com/office/powerpoint/2010/main" val="2461679150"/>
+      </p:ext>
+    </p:extLst>
+  </p:cSld>
+  <p:clrMapOvr>
+    <a:masterClrMapping/>
+  </p:clrMapOvr>
+  <p:timing>
+    <p:tnLst>
+      <p:par>
+        <p:cTn id="1" dur="indefinite" restart="never" nodeType="tmRoot">
+          <p:childTnLst>
+            <p:seq concurrent="1" nextAc="seek">
+              <p:cTn id="2" dur="indefinite" nodeType="mainSeq">
+                <p:childTnLst>
+                  <p:par>
+                    <p:cTn id="3" fill="hold">
+                      <p:stCondLst>
+                        <p:cond delay="indefinite"/>
+                      </p:stCondLst>
+                      <p:childTnLst>
+                        <p:par>
+                          <p:cTn id="4" fill="hold">
+                            <p:stCondLst>
+                              <p:cond delay="0"/>
+                            </p:stCondLst>
+                            <p:childTnLst>
+                              <p:par>
+                                <p:cTn id="5" presetID="1" presetClass="entr" presetSubtype="0" fill="hold" nodeType="clickEffect">
+                                  <p:stCondLst>
+                                    <p:cond delay="0"/>
+                                  </p:stCondLst>
+                                  <p:childTnLst>
+                                    <p:set>
+                                      <p:cBhvr>
+                                        <p:cTn id="6" dur="1" fill="hold">
+                                          <p:stCondLst>
+                                            <p:cond delay="0"/>
+                                          </p:stCondLst>
+                                        </p:cTn>
+                                        <p:tgtEl>
+                                          <p:spTgt spid="3">
+                                            <p:txEl>
+                                              <p:pRg st="0" end="0"/>
+                                            </p:txEl>
+                                          </p:spTgt>
+                                        </p:tgtEl>
+                                        <p:attrNameLst>
+                                          <p:attrName>style.visibility</p:attrName>
+                                        </p:attrNameLst>
+                                      </p:cBhvr>
+                                      <p:to>
+                                        <p:strVal val="visible"/>
+                                      </p:to>
+                                    </p:set>
+                                  </p:childTnLst>
+                                </p:cTn>
+                              </p:par>
+                            </p:childTnLst>
+                          </p:cTn>
+                        </p:par>
+                      </p:childTnLst>
+                    </p:cTn>
+                  </p:par>
+                  <p:par>
+                    <p:cTn id="7" fill="hold">
+                      <p:stCondLst>
+                        <p:cond delay="indefinite"/>
+                      </p:stCondLst>
+                      <p:childTnLst>
+                        <p:par>
+                          <p:cTn id="8" fill="hold">
+                            <p:stCondLst>
+                              <p:cond delay="0"/>
+                            </p:stCondLst>
+                            <p:childTnLst>
+                              <p:par>
+                                <p:cTn id="9" presetID="1" presetClass="entr" presetSubtype="0" fill="hold" nodeType="clickEffect">
+                                  <p:stCondLst>
+                                    <p:cond delay="0"/>
+                                  </p:stCondLst>
+                                  <p:childTnLst>
+                                    <p:set>
+                                      <p:cBhvr>
+                                        <p:cTn id="10" dur="1" fill="hold">
+                                          <p:stCondLst>
+                                            <p:cond delay="0"/>
+                                          </p:stCondLst>
+                                        </p:cTn>
+                                        <p:tgtEl>
+                                          <p:spTgt spid="3">
+                                            <p:txEl>
+                                              <p:pRg st="1" end="1"/>
+                                            </p:txEl>
+                                          </p:spTgt>
+                                        </p:tgtEl>
+                                        <p:attrNameLst>
+                                          <p:attrName>style.visibility</p:attrName>
+                                        </p:attrNameLst>
+                                      </p:cBhvr>
+                                      <p:to>
+                                        <p:strVal val="visible"/>
+                                      </p:to>
+                                    </p:set>
+                                  </p:childTnLst>
+                                </p:cTn>
+                              </p:par>
+                            </p:childTnLst>
+                          </p:cTn>
+                        </p:par>
+                      </p:childTnLst>
+                    </p:cTn>
+                  </p:par>
+                  <p:par>
+                    <p:cTn id="11" fill="hold">
+                      <p:stCondLst>
+                        <p:cond delay="indefinite"/>
+                      </p:stCondLst>
+                      <p:childTnLst>
+                        <p:par>
+                          <p:cTn id="12" fill="hold">
+                            <p:stCondLst>
+                              <p:cond delay="0"/>
+                            </p:stCondLst>
+                            <p:childTnLst>
+                              <p:par>
+                                <p:cTn id="13" presetID="1" presetClass="entr" presetSubtype="0" fill="hold" nodeType="clickEffect">
+                                  <p:stCondLst>
+                                    <p:cond delay="0"/>
+                                  </p:stCondLst>
+                                  <p:childTnLst>
+                                    <p:set>
+                                      <p:cBhvr>
+                                        <p:cTn id="14" dur="1" fill="hold">
+                                          <p:stCondLst>
+                                            <p:cond delay="0"/>
+                                          </p:stCondLst>
+                                        </p:cTn>
+                                        <p:tgtEl>
+                                          <p:spTgt spid="3">
+                                            <p:txEl>
+                                              <p:pRg st="2" end="2"/>
+                                            </p:txEl>
+                                          </p:spTgt>
+                                        </p:tgtEl>
+                                        <p:attrNameLst>
+                                          <p:attrName>style.visibility</p:attrName>
+                                        </p:attrNameLst>
+                                      </p:cBhvr>
+                                      <p:to>
+                                        <p:strVal val="visible"/>
+                                      </p:to>
+                                    </p:set>
+                                  </p:childTnLst>
+                                </p:cTn>
+                              </p:par>
+                            </p:childTnLst>
+                          </p:cTn>
+                        </p:par>
+                      </p:childTnLst>
+                    </p:cTn>
+                  </p:par>
+                  <p:par>
+                    <p:cTn id="15" fill="hold">
+                      <p:stCondLst>
+                        <p:cond delay="indefinite"/>
+                      </p:stCondLst>
+                      <p:childTnLst>
+                        <p:par>
+                          <p:cTn id="16" fill="hold">
+                            <p:stCondLst>
+                              <p:cond delay="0"/>
+                            </p:stCondLst>
+                            <p:childTnLst>
+                              <p:par>
+                                <p:cTn id="17" presetID="1" presetClass="entr" presetSubtype="0" fill="hold" nodeType="clickEffect">
+                                  <p:stCondLst>
+                                    <p:cond delay="0"/>
+                                  </p:stCondLst>
+                                  <p:childTnLst>
+                                    <p:set>
+                                      <p:cBhvr>
+                                        <p:cTn id="18" dur="1" fill="hold">
+                                          <p:stCondLst>
+                                            <p:cond delay="0"/>
+                                          </p:stCondLst>
+                                        </p:cTn>
+                                        <p:tgtEl>
+                                          <p:spTgt spid="3">
+                                            <p:txEl>
+                                              <p:pRg st="3" end="3"/>
+                                            </p:txEl>
+                                          </p:spTgt>
+                                        </p:tgtEl>
+                                        <p:attrNameLst>
+                                          <p:attrName>style.visibility</p:attrName>
+                                        </p:attrNameLst>
+                                      </p:cBhvr>
+                                      <p:to>
+                                        <p:strVal val="visible"/>
+                                      </p:to>
+                                    </p:set>
+                                  </p:childTnLst>
+                                </p:cTn>
+                              </p:par>
+                            </p:childTnLst>
+                          </p:cTn>
+                        </p:par>
+                      </p:childTnLst>
+                    </p:cTn>
+                  </p:par>
+                  <p:par>
+                    <p:cTn id="19" fill="hold">
+                      <p:stCondLst>
+                        <p:cond delay="indefinite"/>
+                      </p:stCondLst>
+                      <p:childTnLst>
+                        <p:par>
+                          <p:cTn id="20" fill="hold">
+                            <p:stCondLst>
+                              <p:cond delay="0"/>
+                            </p:stCondLst>
+                            <p:childTnLst>
+                              <p:par>
+                                <p:cTn id="21" presetID="1" presetClass="entr" presetSubtype="0" fill="hold" nodeType="clickEffect">
+                                  <p:stCondLst>
+                                    <p:cond delay="0"/>
+                                  </p:stCondLst>
+                                  <p:childTnLst>
+                                    <p:set>
+                                      <p:cBhvr>
+                                        <p:cTn id="22" dur="1" fill="hold">
+                                          <p:stCondLst>
+                                            <p:cond delay="0"/>
+                                          </p:stCondLst>
+                                        </p:cTn>
+                                        <p:tgtEl>
+                                          <p:spTgt spid="3">
+                                            <p:txEl>
+                                              <p:pRg st="4" end="4"/>
+                                            </p:txEl>
+                                          </p:spTgt>
+                                        </p:tgtEl>
+                                        <p:attrNameLst>
+                                          <p:attrName>style.visibility</p:attrName>
+                                        </p:attrNameLst>
+                                      </p:cBhvr>
+                                      <p:to>
+                                        <p:strVal val="visible"/>
+                                      </p:to>
+                                    </p:set>
+                                  </p:childTnLst>
+                                </p:cTn>
+                              </p:par>
+                            </p:childTnLst>
+                          </p:cTn>
+                        </p:par>
+                      </p:childTnLst>
+                    </p:cTn>
+                  </p:par>
+                  <p:par>
+                    <p:cTn id="23" fill="hold">
+                      <p:stCondLst>
+                        <p:cond delay="indefinite"/>
+                      </p:stCondLst>
+                      <p:childTnLst>
+                        <p:par>
+                          <p:cTn id="24" fill="hold">
+                            <p:stCondLst>
+                              <p:cond delay="0"/>
+                            </p:stCondLst>
+                            <p:childTnLst>
+                              <p:par>
+                                <p:cTn id="25" presetID="1" presetClass="entr" presetSubtype="0" fill="hold" nodeType="clickEffect">
+                                  <p:stCondLst>
+                                    <p:cond delay="0"/>
+                                  </p:stCondLst>
+                                  <p:childTnLst>
+                                    <p:set>
+                                      <p:cBhvr>
+                                        <p:cTn id="26" dur="1" fill="hold">
+                                          <p:stCondLst>
+                                            <p:cond delay="0"/>
+                                          </p:stCondLst>
+                                        </p:cTn>
+                                        <p:tgtEl>
+                                          <p:spTgt spid="3">
+                                            <p:txEl>
+                                              <p:pRg st="5" end="5"/>
+                                            </p:txEl>
+                                          </p:spTgt>
+                                        </p:tgtEl>
+                                        <p:attrNameLst>
+                                          <p:attrName>style.visibility</p:attrName>
+                                        </p:attrNameLst>
+                                      </p:cBhvr>
+                                      <p:to>
+                                        <p:strVal val="visible"/>
+                                      </p:to>
+                                    </p:set>
+                                  </p:childTnLst>
+                                </p:cTn>
+                              </p:par>
+                            </p:childTnLst>
+                          </p:cTn>
+                        </p:par>
+                      </p:childTnLst>
+                    </p:cTn>
+                  </p:par>
+                  <p:par>
+                    <p:cTn id="27" fill="hold">
+                      <p:stCondLst>
+                        <p:cond delay="indefinite"/>
+                      </p:stCondLst>
+                      <p:childTnLst>
+                        <p:par>
+                          <p:cTn id="28" fill="hold">
+                            <p:stCondLst>
+                              <p:cond delay="0"/>
+                            </p:stCondLst>
+                            <p:childTnLst>
+                              <p:par>
+                                <p:cTn id="29" presetID="1" presetClass="entr" presetSubtype="0" fill="hold" nodeType="clickEffect">
+                                  <p:stCondLst>
+                                    <p:cond delay="0"/>
+                                  </p:stCondLst>
+                                  <p:childTnLst>
+                                    <p:set>
+                                      <p:cBhvr>
+                                        <p:cTn id="30" dur="1" fill="hold">
+                                          <p:stCondLst>
+                                            <p:cond delay="0"/>
+                                          </p:stCondLst>
+                                        </p:cTn>
+                                        <p:tgtEl>
+                                          <p:spTgt spid="3">
+                                            <p:txEl>
+                                              <p:pRg st="6" end="6"/>
+                                            </p:txEl>
+                                          </p:spTgt>
+                                        </p:tgtEl>
+                                        <p:attrNameLst>
+                                          <p:attrName>style.visibility</p:attrName>
+                                        </p:attrNameLst>
+                                      </p:cBhvr>
+                                      <p:to>
+                                        <p:strVal val="visible"/>
+                                      </p:to>
+                                    </p:set>
+                                  </p:childTnLst>
+                                </p:cTn>
+                              </p:par>
+                            </p:childTnLst>
+                          </p:cTn>
+                        </p:par>
+                      </p:childTnLst>
+                    </p:cTn>
+                  </p:par>
+                  <p:par>
+                    <p:cTn id="31" fill="hold">
+                      <p:stCondLst>
+                        <p:cond delay="indefinite"/>
+                      </p:stCondLst>
+                      <p:childTnLst>
+                        <p:par>
+                          <p:cTn id="32" fill="hold">
+                            <p:stCondLst>
+                              <p:cond delay="0"/>
+                            </p:stCondLst>
+                            <p:childTnLst>
+                              <p:par>
+                                <p:cTn id="33" presetID="9" presetClass="entr" presetSubtype="0" fill="hold" nodeType="clickEffect">
+                                  <p:stCondLst>
+                                    <p:cond delay="0"/>
+                                  </p:stCondLst>
+                                  <p:childTnLst>
+                                    <p:set>
+                                      <p:cBhvr>
+                                        <p:cTn id="34" dur="1" fill="hold">
+                                          <p:stCondLst>
+                                            <p:cond delay="0"/>
+                                          </p:stCondLst>
+                                        </p:cTn>
+                                        <p:tgtEl>
+                                          <p:spTgt spid="5"/>
+                                        </p:tgtEl>
+                                        <p:attrNameLst>
+                                          <p:attrName>style.visibility</p:attrName>
+                                        </p:attrNameLst>
+                                      </p:cBhvr>
+                                      <p:to>
+                                        <p:strVal val="visible"/>
+                                      </p:to>
+                                    </p:set>
+                                    <p:animEffect transition="in" filter="dissolve">
+                                      <p:cBhvr>
+                                        <p:cTn id="35" dur="500"/>
+                                        <p:tgtEl>
+                                          <p:spTgt spid="5"/>
+                                        </p:tgtEl>
+                                      </p:cBhvr>
+                                    </p:animEffect>
+                                  </p:childTnLst>
+                                </p:cTn>
+                              </p:par>
+                              <p:par>
+                                <p:cTn id="36" presetID="9" presetClass="entr" presetSubtype="0" fill="hold" grpId="0" nodeType="withEffect">
+                                  <p:stCondLst>
+                                    <p:cond delay="0"/>
+                                  </p:stCondLst>
+                                  <p:childTnLst>
+                                    <p:set>
+                                      <p:cBhvr>
+                                        <p:cTn id="37" dur="1" fill="hold">
+                                          <p:stCondLst>
+                                            <p:cond delay="0"/>
+                                          </p:stCondLst>
+                                        </p:cTn>
+                                        <p:tgtEl>
+                                          <p:spTgt spid="6"/>
+                                        </p:tgtEl>
+                                        <p:attrNameLst>
+                                          <p:attrName>style.visibility</p:attrName>
+                                        </p:attrNameLst>
+                                      </p:cBhvr>
+                                      <p:to>
+                                        <p:strVal val="visible"/>
+                                      </p:to>
+                                    </p:set>
+                                    <p:animEffect transition="in" filter="dissolve">
+                                      <p:cBhvr>
+                                        <p:cTn id="38" dur="500"/>
+                                        <p:tgtEl>
+                                          <p:spTgt spid="6"/>
+                                        </p:tgtEl>
+                                      </p:cBhvr>
+                                    </p:animEffect>
+                                  </p:childTnLst>
+                                </p:cTn>
+                              </p:par>
+                              <p:par>
+                                <p:cTn id="39" presetID="9" presetClass="entr" presetSubtype="0" fill="hold" grpId="0" nodeType="withEffect">
+                                  <p:stCondLst>
+                                    <p:cond delay="0"/>
+                                  </p:stCondLst>
+                                  <p:childTnLst>
+                                    <p:set>
+                                      <p:cBhvr>
+                                        <p:cTn id="40" dur="1" fill="hold">
+                                          <p:stCondLst>
+                                            <p:cond delay="0"/>
+                                          </p:stCondLst>
+                                        </p:cTn>
+                                        <p:tgtEl>
+                                          <p:spTgt spid="7"/>
+                                        </p:tgtEl>
+                                        <p:attrNameLst>
+                                          <p:attrName>style.visibility</p:attrName>
+                                        </p:attrNameLst>
+                                      </p:cBhvr>
+                                      <p:to>
+                                        <p:strVal val="visible"/>
+                                      </p:to>
+                                    </p:set>
+                                    <p:animEffect transition="in" filter="dissolve">
+                                      <p:cBhvr>
+                                        <p:cTn id="41" dur="500"/>
+                                        <p:tgtEl>
+                                          <p:spTgt spid="7"/>
+                                        </p:tgtEl>
+                                      </p:cBhvr>
+                                    </p:animEffect>
+                                  </p:childTnLst>
+                                </p:cTn>
+                              </p:par>
+                            </p:childTnLst>
+                          </p:cTn>
+                        </p:par>
+                      </p:childTnLst>
+                    </p:cTn>
+                  </p:par>
+                </p:childTnLst>
+              </p:cTn>
+              <p:prevCondLst>
+                <p:cond evt="onPrev" delay="0">
+                  <p:tgtEl>
+                    <p:sldTgt/>
+                  </p:tgtEl>
+                </p:cond>
+              </p:prevCondLst>
+              <p:nextCondLst>
+                <p:cond evt="onNext" delay="0">
+                  <p:tgtEl>
+                    <p:sldTgt/>
+                  </p:tgtEl>
+                </p:cond>
+              </p:nextCondLst>
+            </p:seq>
+          </p:childTnLst>
+        </p:cTn>
+      </p:par>
+    </p:tnLst>
+    <p:bldLst>
+      <p:bldP spid="6" grpId="0"/>
+      <p:bldP spid="7" grpId="0"/>
+    </p:bldLst>
+  </p:timing>
+</p:sld>
+</file>
+
+<file path=ppt/slides/slide5.xml><?xml version="1.0" encoding="utf-8"?>
 <p:sld xmlns:a="http://schemas.openxmlformats.org/drawingml/2006/main" xmlns:r="http://schemas.openxmlformats.org/officeDocument/2006/relationships" xmlns:p="http://schemas.openxmlformats.org/presentationml/2006/main">
   <p:cSld>
     <p:spTree>
@@ -12710,7 +13693,7 @@
           <a:effectLst/>
           <a:extLst>
             <a:ext uri="{909E8E84-426E-40dd-AFC4-6F175D3DCCD1}">
-              <a14:hiddenFill xmlns:a14="http://schemas.microsoft.com/office/drawing/2010/main" xmlns="">
+              <a14:hiddenFill xmlns="" xmlns:a14="http://schemas.microsoft.com/office/drawing/2010/main">
                 <a:blipFill dpi="0" rotWithShape="0">
                   <a:blip/>
                   <a:srcRect/>
@@ -12721,7 +13704,7 @@
               </a14:hiddenFill>
             </a:ext>
             <a:ext uri="{91240B29-F687-4f45-9708-019B960494DF}">
-              <a14:hiddenLine xmlns:a14="http://schemas.microsoft.com/office/drawing/2010/main" xmlns="" w="9525">
+              <a14:hiddenLine xmlns="" xmlns:a14="http://schemas.microsoft.com/office/drawing/2010/main" w="9525">
                 <a:solidFill>
                   <a:srgbClr val="000000"/>
                 </a:solidFill>
@@ -12731,7 +13714,7 @@
               </a14:hiddenLine>
             </a:ext>
             <a:ext uri="{AF507438-7753-43e0-B8FC-AC1667EBCBE1}">
-              <a14:hiddenEffects xmlns:a14="http://schemas.microsoft.com/office/drawing/2010/main" xmlns="">
+              <a14:hiddenEffects xmlns="" xmlns:a14="http://schemas.microsoft.com/office/drawing/2010/main">
                 <a:effectLst>
                   <a:outerShdw blurRad="63500" dist="38099" dir="2700000" algn="ctr" rotWithShape="0">
                     <a:srgbClr val="000000">
@@ -12786,7 +13769,7 @@
           <a:effectLst/>
           <a:extLst>
             <a:ext uri="{909E8E84-426E-40dd-AFC4-6F175D3DCCD1}">
-              <a14:hiddenFill xmlns:a14="http://schemas.microsoft.com/office/drawing/2010/main" xmlns="">
+              <a14:hiddenFill xmlns="" xmlns:a14="http://schemas.microsoft.com/office/drawing/2010/main">
                 <a:blipFill dpi="0" rotWithShape="0">
                   <a:blip/>
                   <a:srcRect/>
@@ -12797,7 +13780,7 @@
               </a14:hiddenFill>
             </a:ext>
             <a:ext uri="{91240B29-F687-4f45-9708-019B960494DF}">
-              <a14:hiddenLine xmlns:a14="http://schemas.microsoft.com/office/drawing/2010/main" xmlns="" w="9525">
+              <a14:hiddenLine xmlns="" xmlns:a14="http://schemas.microsoft.com/office/drawing/2010/main" w="9525">
                 <a:solidFill>
                   <a:srgbClr val="000000"/>
                 </a:solidFill>
@@ -12807,7 +13790,7 @@
               </a14:hiddenLine>
             </a:ext>
             <a:ext uri="{AF507438-7753-43e0-B8FC-AC1667EBCBE1}">
-              <a14:hiddenEffects xmlns:a14="http://schemas.microsoft.com/office/drawing/2010/main" xmlns="">
+              <a14:hiddenEffects xmlns="" xmlns:a14="http://schemas.microsoft.com/office/drawing/2010/main">
                 <a:effectLst>
                   <a:outerShdw blurRad="63500" dist="38099" dir="2700000" algn="ctr" rotWithShape="0">
                     <a:srgbClr val="000000">
@@ -13266,7 +14249,7 @@
           <a:effectLst/>
           <a:extLst>
             <a:ext uri="{909E8E84-426E-40dd-AFC4-6F175D3DCCD1}">
-              <a14:hiddenFill xmlns:a14="http://schemas.microsoft.com/office/drawing/2010/main" xmlns="">
+              <a14:hiddenFill xmlns="" xmlns:a14="http://schemas.microsoft.com/office/drawing/2010/main">
                 <a:blipFill dpi="0" rotWithShape="0">
                   <a:blip/>
                   <a:srcRect/>
@@ -13277,7 +14260,7 @@
               </a14:hiddenFill>
             </a:ext>
             <a:ext uri="{91240B29-F687-4f45-9708-019B960494DF}">
-              <a14:hiddenLine xmlns:a14="http://schemas.microsoft.com/office/drawing/2010/main" xmlns="" w="9525">
+              <a14:hiddenLine xmlns="" xmlns:a14="http://schemas.microsoft.com/office/drawing/2010/main" w="9525">
                 <a:solidFill>
                   <a:srgbClr val="000000"/>
                 </a:solidFill>
@@ -13287,7 +14270,7 @@
               </a14:hiddenLine>
             </a:ext>
             <a:ext uri="{AF507438-7753-43e0-B8FC-AC1667EBCBE1}">
-              <a14:hiddenEffects xmlns:a14="http://schemas.microsoft.com/office/drawing/2010/main" xmlns="">
+              <a14:hiddenEffects xmlns="" xmlns:a14="http://schemas.microsoft.com/office/drawing/2010/main">
                 <a:effectLst>
                   <a:outerShdw blurRad="63500" dist="38099" dir="2700000" algn="ctr" rotWithShape="0">
                     <a:srgbClr val="000000">
@@ -13776,7 +14759,7 @@
           <a:effectLst/>
           <a:extLst>
             <a:ext uri="{909E8E84-426E-40dd-AFC4-6F175D3DCCD1}">
-              <a14:hiddenFill xmlns:a14="http://schemas.microsoft.com/office/drawing/2010/main" xmlns="">
+              <a14:hiddenFill xmlns="" xmlns:a14="http://schemas.microsoft.com/office/drawing/2010/main">
                 <a:blipFill dpi="0" rotWithShape="0">
                   <a:blip/>
                   <a:srcRect/>
@@ -13787,7 +14770,7 @@
               </a14:hiddenFill>
             </a:ext>
             <a:ext uri="{91240B29-F687-4f45-9708-019B960494DF}">
-              <a14:hiddenLine xmlns:a14="http://schemas.microsoft.com/office/drawing/2010/main" xmlns="" w="9525">
+              <a14:hiddenLine xmlns="" xmlns:a14="http://schemas.microsoft.com/office/drawing/2010/main" w="9525">
                 <a:solidFill>
                   <a:srgbClr val="000000"/>
                 </a:solidFill>
@@ -13797,7 +14780,7 @@
               </a14:hiddenLine>
             </a:ext>
             <a:ext uri="{AF507438-7753-43e0-B8FC-AC1667EBCBE1}">
-              <a14:hiddenEffects xmlns:a14="http://schemas.microsoft.com/office/drawing/2010/main" xmlns="">
+              <a14:hiddenEffects xmlns="" xmlns:a14="http://schemas.microsoft.com/office/drawing/2010/main">
                 <a:effectLst>
                   <a:outerShdw blurRad="63500" dist="38099" dir="2700000" algn="ctr" rotWithShape="0">
                     <a:srgbClr val="000000">
@@ -13852,7 +14835,7 @@
           <a:effectLst/>
           <a:extLst>
             <a:ext uri="{909E8E84-426E-40dd-AFC4-6F175D3DCCD1}">
-              <a14:hiddenFill xmlns:a14="http://schemas.microsoft.com/office/drawing/2010/main" xmlns="">
+              <a14:hiddenFill xmlns="" xmlns:a14="http://schemas.microsoft.com/office/drawing/2010/main">
                 <a:blipFill dpi="0" rotWithShape="0">
                   <a:blip/>
                   <a:srcRect/>
@@ -13863,7 +14846,7 @@
               </a14:hiddenFill>
             </a:ext>
             <a:ext uri="{91240B29-F687-4f45-9708-019B960494DF}">
-              <a14:hiddenLine xmlns:a14="http://schemas.microsoft.com/office/drawing/2010/main" xmlns="" w="9525">
+              <a14:hiddenLine xmlns="" xmlns:a14="http://schemas.microsoft.com/office/drawing/2010/main" w="9525">
                 <a:solidFill>
                   <a:srgbClr val="000000"/>
                 </a:solidFill>
@@ -13873,7 +14856,7 @@
               </a14:hiddenLine>
             </a:ext>
             <a:ext uri="{AF507438-7753-43e0-B8FC-AC1667EBCBE1}">
-              <a14:hiddenEffects xmlns:a14="http://schemas.microsoft.com/office/drawing/2010/main" xmlns="">
+              <a14:hiddenEffects xmlns="" xmlns:a14="http://schemas.microsoft.com/office/drawing/2010/main">
                 <a:effectLst>
                   <a:outerShdw blurRad="63500" dist="38099" dir="2700000" algn="ctr" rotWithShape="0">
                     <a:srgbClr val="000000">
@@ -13928,7 +14911,7 @@
           <a:effectLst/>
           <a:extLst>
             <a:ext uri="{909E8E84-426E-40dd-AFC4-6F175D3DCCD1}">
-              <a14:hiddenFill xmlns:a14="http://schemas.microsoft.com/office/drawing/2010/main" xmlns="">
+              <a14:hiddenFill xmlns="" xmlns:a14="http://schemas.microsoft.com/office/drawing/2010/main">
                 <a:blipFill dpi="0" rotWithShape="0">
                   <a:blip/>
                   <a:srcRect/>
@@ -13939,7 +14922,7 @@
               </a14:hiddenFill>
             </a:ext>
             <a:ext uri="{91240B29-F687-4f45-9708-019B960494DF}">
-              <a14:hiddenLine xmlns:a14="http://schemas.microsoft.com/office/drawing/2010/main" xmlns="" w="9525">
+              <a14:hiddenLine xmlns="" xmlns:a14="http://schemas.microsoft.com/office/drawing/2010/main" w="9525">
                 <a:solidFill>
                   <a:srgbClr val="000000"/>
                 </a:solidFill>
@@ -13949,7 +14932,7 @@
               </a14:hiddenLine>
             </a:ext>
             <a:ext uri="{AF507438-7753-43e0-B8FC-AC1667EBCBE1}">
-              <a14:hiddenEffects xmlns:a14="http://schemas.microsoft.com/office/drawing/2010/main" xmlns="">
+              <a14:hiddenEffects xmlns="" xmlns:a14="http://schemas.microsoft.com/office/drawing/2010/main">
                 <a:effectLst>
                   <a:outerShdw blurRad="63500" dist="38099" dir="2700000" algn="ctr" rotWithShape="0">
                     <a:srgbClr val="000000">
@@ -14216,7 +15199,7 @@
           <a:effectLst/>
           <a:extLst>
             <a:ext uri="{909E8E84-426E-40dd-AFC4-6F175D3DCCD1}">
-              <a14:hiddenFill xmlns:a14="http://schemas.microsoft.com/office/drawing/2010/main" xmlns="">
+              <a14:hiddenFill xmlns="" xmlns:a14="http://schemas.microsoft.com/office/drawing/2010/main">
                 <a:blipFill dpi="0" rotWithShape="0">
                   <a:blip/>
                   <a:srcRect/>
@@ -14227,7 +15210,7 @@
               </a14:hiddenFill>
             </a:ext>
             <a:ext uri="{91240B29-F687-4f45-9708-019B960494DF}">
-              <a14:hiddenLine xmlns:a14="http://schemas.microsoft.com/office/drawing/2010/main" xmlns="" w="9525">
+              <a14:hiddenLine xmlns="" xmlns:a14="http://schemas.microsoft.com/office/drawing/2010/main" w="9525">
                 <a:solidFill>
                   <a:srgbClr val="000000"/>
                 </a:solidFill>
@@ -14237,7 +15220,7 @@
               </a14:hiddenLine>
             </a:ext>
             <a:ext uri="{AF507438-7753-43e0-B8FC-AC1667EBCBE1}">
-              <a14:hiddenEffects xmlns:a14="http://schemas.microsoft.com/office/drawing/2010/main" xmlns="">
+              <a14:hiddenEffects xmlns="" xmlns:a14="http://schemas.microsoft.com/office/drawing/2010/main">
                 <a:effectLst>
                   <a:outerShdw blurRad="63500" dist="38099" dir="2700000" algn="ctr" rotWithShape="0">
                     <a:srgbClr val="000000">
@@ -14292,7 +15275,7 @@
           <a:effectLst/>
           <a:extLst>
             <a:ext uri="{909E8E84-426E-40dd-AFC4-6F175D3DCCD1}">
-              <a14:hiddenFill xmlns:a14="http://schemas.microsoft.com/office/drawing/2010/main" xmlns="">
+              <a14:hiddenFill xmlns="" xmlns:a14="http://schemas.microsoft.com/office/drawing/2010/main">
                 <a:blipFill dpi="0" rotWithShape="0">
                   <a:blip/>
                   <a:srcRect/>
@@ -14303,7 +15286,7 @@
               </a14:hiddenFill>
             </a:ext>
             <a:ext uri="{91240B29-F687-4f45-9708-019B960494DF}">
-              <a14:hiddenLine xmlns:a14="http://schemas.microsoft.com/office/drawing/2010/main" xmlns="" w="9525">
+              <a14:hiddenLine xmlns="" xmlns:a14="http://schemas.microsoft.com/office/drawing/2010/main" w="9525">
                 <a:solidFill>
                   <a:srgbClr val="000000"/>
                 </a:solidFill>
@@ -14313,7 +15296,7 @@
               </a14:hiddenLine>
             </a:ext>
             <a:ext uri="{AF507438-7753-43e0-B8FC-AC1667EBCBE1}">
-              <a14:hiddenEffects xmlns:a14="http://schemas.microsoft.com/office/drawing/2010/main" xmlns="">
+              <a14:hiddenEffects xmlns="" xmlns:a14="http://schemas.microsoft.com/office/drawing/2010/main">
                 <a:effectLst>
                   <a:outerShdw blurRad="63500" dist="38099" dir="2700000" algn="ctr" rotWithShape="0">
                     <a:srgbClr val="000000">
@@ -14368,7 +15351,7 @@
           <a:effectLst/>
           <a:extLst>
             <a:ext uri="{909E8E84-426E-40dd-AFC4-6F175D3DCCD1}">
-              <a14:hiddenFill xmlns:a14="http://schemas.microsoft.com/office/drawing/2010/main" xmlns="">
+              <a14:hiddenFill xmlns="" xmlns:a14="http://schemas.microsoft.com/office/drawing/2010/main">
                 <a:blipFill dpi="0" rotWithShape="0">
                   <a:blip/>
                   <a:srcRect/>
@@ -14379,7 +15362,7 @@
               </a14:hiddenFill>
             </a:ext>
             <a:ext uri="{91240B29-F687-4f45-9708-019B960494DF}">
-              <a14:hiddenLine xmlns:a14="http://schemas.microsoft.com/office/drawing/2010/main" xmlns="" w="9525">
+              <a14:hiddenLine xmlns="" xmlns:a14="http://schemas.microsoft.com/office/drawing/2010/main" w="9525">
                 <a:solidFill>
                   <a:srgbClr val="000000"/>
                 </a:solidFill>
@@ -14389,7 +15372,7 @@
               </a14:hiddenLine>
             </a:ext>
             <a:ext uri="{AF507438-7753-43e0-B8FC-AC1667EBCBE1}">
-              <a14:hiddenEffects xmlns:a14="http://schemas.microsoft.com/office/drawing/2010/main" xmlns="">
+              <a14:hiddenEffects xmlns="" xmlns:a14="http://schemas.microsoft.com/office/drawing/2010/main">
                 <a:effectLst>
                   <a:outerShdw blurRad="63500" dist="38099" dir="2700000" algn="ctr" rotWithShape="0">
                     <a:srgbClr val="000000">
@@ -16047,7 +17030,7 @@
 </p:sld>
 </file>
 
-<file path=ppt/slides/slide5.xml><?xml version="1.0" encoding="utf-8"?>
+<file path=ppt/slides/slide6.xml><?xml version="1.0" encoding="utf-8"?>
 <p:sld xmlns:a="http://schemas.openxmlformats.org/drawingml/2006/main" xmlns:r="http://schemas.openxmlformats.org/officeDocument/2006/relationships" xmlns:p="http://schemas.openxmlformats.org/presentationml/2006/main">
   <p:cSld>
     <p:spTree>
@@ -16246,7 +17229,7 @@
           <a:effectLst/>
           <a:extLst>
             <a:ext uri="{909E8E84-426E-40dd-AFC4-6F175D3DCCD1}">
-              <a14:hiddenFill xmlns:a14="http://schemas.microsoft.com/office/drawing/2010/main" xmlns="">
+              <a14:hiddenFill xmlns="" xmlns:a14="http://schemas.microsoft.com/office/drawing/2010/main">
                 <a:blipFill dpi="0" rotWithShape="0">
                   <a:blip/>
                   <a:srcRect/>
@@ -16257,7 +17240,7 @@
               </a14:hiddenFill>
             </a:ext>
             <a:ext uri="{91240B29-F687-4f45-9708-019B960494DF}">
-              <a14:hiddenLine xmlns:a14="http://schemas.microsoft.com/office/drawing/2010/main" xmlns="" w="9525">
+              <a14:hiddenLine xmlns="" xmlns:a14="http://schemas.microsoft.com/office/drawing/2010/main" w="9525">
                 <a:solidFill>
                   <a:srgbClr val="000000"/>
                 </a:solidFill>
@@ -16267,7 +17250,7 @@
               </a14:hiddenLine>
             </a:ext>
             <a:ext uri="{AF507438-7753-43e0-B8FC-AC1667EBCBE1}">
-              <a14:hiddenEffects xmlns:a14="http://schemas.microsoft.com/office/drawing/2010/main" xmlns="">
+              <a14:hiddenEffects xmlns="" xmlns:a14="http://schemas.microsoft.com/office/drawing/2010/main">
                 <a:effectLst>
                   <a:outerShdw blurRad="63500" dist="38099" dir="2700000" algn="ctr" rotWithShape="0">
                     <a:srgbClr val="000000">
@@ -16322,7 +17305,7 @@
           <a:effectLst/>
           <a:extLst>
             <a:ext uri="{909E8E84-426E-40dd-AFC4-6F175D3DCCD1}">
-              <a14:hiddenFill xmlns:a14="http://schemas.microsoft.com/office/drawing/2010/main" xmlns="">
+              <a14:hiddenFill xmlns="" xmlns:a14="http://schemas.microsoft.com/office/drawing/2010/main">
                 <a:blipFill dpi="0" rotWithShape="0">
                   <a:blip/>
                   <a:srcRect/>
@@ -16333,7 +17316,7 @@
               </a14:hiddenFill>
             </a:ext>
             <a:ext uri="{91240B29-F687-4f45-9708-019B960494DF}">
-              <a14:hiddenLine xmlns:a14="http://schemas.microsoft.com/office/drawing/2010/main" xmlns="" w="9525">
+              <a14:hiddenLine xmlns="" xmlns:a14="http://schemas.microsoft.com/office/drawing/2010/main" w="9525">
                 <a:solidFill>
                   <a:srgbClr val="000000"/>
                 </a:solidFill>
@@ -16343,7 +17326,7 @@
               </a14:hiddenLine>
             </a:ext>
             <a:ext uri="{AF507438-7753-43e0-B8FC-AC1667EBCBE1}">
-              <a14:hiddenEffects xmlns:a14="http://schemas.microsoft.com/office/drawing/2010/main" xmlns="">
+              <a14:hiddenEffects xmlns="" xmlns:a14="http://schemas.microsoft.com/office/drawing/2010/main">
                 <a:effectLst>
                   <a:outerShdw blurRad="63500" dist="38099" dir="2700000" algn="ctr" rotWithShape="0">
                     <a:srgbClr val="000000">
@@ -17457,7 +18440,7 @@
           <a:effectLst/>
           <a:extLst>
             <a:ext uri="{909E8E84-426E-40dd-AFC4-6F175D3DCCD1}">
-              <a14:hiddenFill xmlns:a14="http://schemas.microsoft.com/office/drawing/2010/main" xmlns="">
+              <a14:hiddenFill xmlns="" xmlns:a14="http://schemas.microsoft.com/office/drawing/2010/main">
                 <a:blipFill dpi="0" rotWithShape="0">
                   <a:blip/>
                   <a:srcRect/>
@@ -17468,7 +18451,7 @@
               </a14:hiddenFill>
             </a:ext>
             <a:ext uri="{91240B29-F687-4f45-9708-019B960494DF}">
-              <a14:hiddenLine xmlns:a14="http://schemas.microsoft.com/office/drawing/2010/main" xmlns="" w="9525">
+              <a14:hiddenLine xmlns="" xmlns:a14="http://schemas.microsoft.com/office/drawing/2010/main" w="9525">
                 <a:solidFill>
                   <a:srgbClr val="000000"/>
                 </a:solidFill>
@@ -17478,7 +18461,7 @@
               </a14:hiddenLine>
             </a:ext>
             <a:ext uri="{AF507438-7753-43e0-B8FC-AC1667EBCBE1}">
-              <a14:hiddenEffects xmlns:a14="http://schemas.microsoft.com/office/drawing/2010/main" xmlns="">
+              <a14:hiddenEffects xmlns="" xmlns:a14="http://schemas.microsoft.com/office/drawing/2010/main">
                 <a:effectLst>
                   <a:outerShdw blurRad="63500" dist="38099" dir="2700000" algn="ctr" rotWithShape="0">
                     <a:srgbClr val="000000">
@@ -18320,7 +19303,7 @@
           <a:effectLst/>
           <a:extLst>
             <a:ext uri="{909E8E84-426E-40dd-AFC4-6F175D3DCCD1}">
-              <a14:hiddenFill xmlns:a14="http://schemas.microsoft.com/office/drawing/2010/main" xmlns="">
+              <a14:hiddenFill xmlns="" xmlns:a14="http://schemas.microsoft.com/office/drawing/2010/main">
                 <a:blipFill dpi="0" rotWithShape="0">
                   <a:blip/>
                   <a:srcRect/>
@@ -18331,7 +19314,7 @@
               </a14:hiddenFill>
             </a:ext>
             <a:ext uri="{91240B29-F687-4f45-9708-019B960494DF}">
-              <a14:hiddenLine xmlns:a14="http://schemas.microsoft.com/office/drawing/2010/main" xmlns="" w="9525">
+              <a14:hiddenLine xmlns="" xmlns:a14="http://schemas.microsoft.com/office/drawing/2010/main" w="9525">
                 <a:solidFill>
                   <a:srgbClr val="000000"/>
                 </a:solidFill>
@@ -18341,7 +19324,7 @@
               </a14:hiddenLine>
             </a:ext>
             <a:ext uri="{AF507438-7753-43e0-B8FC-AC1667EBCBE1}">
-              <a14:hiddenEffects xmlns:a14="http://schemas.microsoft.com/office/drawing/2010/main" xmlns="">
+              <a14:hiddenEffects xmlns="" xmlns:a14="http://schemas.microsoft.com/office/drawing/2010/main">
                 <a:effectLst>
                   <a:outerShdw blurRad="63500" dist="38099" dir="2700000" algn="ctr" rotWithShape="0">
                     <a:srgbClr val="000000">
@@ -18396,7 +19379,7 @@
           <a:effectLst/>
           <a:extLst>
             <a:ext uri="{909E8E84-426E-40dd-AFC4-6F175D3DCCD1}">
-              <a14:hiddenFill xmlns:a14="http://schemas.microsoft.com/office/drawing/2010/main" xmlns="">
+              <a14:hiddenFill xmlns="" xmlns:a14="http://schemas.microsoft.com/office/drawing/2010/main">
                 <a:blipFill dpi="0" rotWithShape="0">
                   <a:blip/>
                   <a:srcRect/>
@@ -18407,7 +19390,7 @@
               </a14:hiddenFill>
             </a:ext>
             <a:ext uri="{91240B29-F687-4f45-9708-019B960494DF}">
-              <a14:hiddenLine xmlns:a14="http://schemas.microsoft.com/office/drawing/2010/main" xmlns="" w="9525">
+              <a14:hiddenLine xmlns="" xmlns:a14="http://schemas.microsoft.com/office/drawing/2010/main" w="9525">
                 <a:solidFill>
                   <a:srgbClr val="000000"/>
                 </a:solidFill>
@@ -18417,7 +19400,7 @@
               </a14:hiddenLine>
             </a:ext>
             <a:ext uri="{AF507438-7753-43e0-B8FC-AC1667EBCBE1}">
-              <a14:hiddenEffects xmlns:a14="http://schemas.microsoft.com/office/drawing/2010/main" xmlns="">
+              <a14:hiddenEffects xmlns="" xmlns:a14="http://schemas.microsoft.com/office/drawing/2010/main">
                 <a:effectLst>
                   <a:outerShdw blurRad="63500" dist="38099" dir="2700000" algn="ctr" rotWithShape="0">
                     <a:srgbClr val="000000">
@@ -18472,7 +19455,7 @@
           <a:effectLst/>
           <a:extLst>
             <a:ext uri="{909E8E84-426E-40dd-AFC4-6F175D3DCCD1}">
-              <a14:hiddenFill xmlns:a14="http://schemas.microsoft.com/office/drawing/2010/main" xmlns="">
+              <a14:hiddenFill xmlns="" xmlns:a14="http://schemas.microsoft.com/office/drawing/2010/main">
                 <a:blipFill dpi="0" rotWithShape="0">
                   <a:blip/>
                   <a:srcRect/>
@@ -18483,7 +19466,7 @@
               </a14:hiddenFill>
             </a:ext>
             <a:ext uri="{91240B29-F687-4f45-9708-019B960494DF}">
-              <a14:hiddenLine xmlns:a14="http://schemas.microsoft.com/office/drawing/2010/main" xmlns="" w="9525">
+              <a14:hiddenLine xmlns="" xmlns:a14="http://schemas.microsoft.com/office/drawing/2010/main" w="9525">
                 <a:solidFill>
                   <a:srgbClr val="000000"/>
                 </a:solidFill>
@@ -18493,7 +19476,7 @@
               </a14:hiddenLine>
             </a:ext>
             <a:ext uri="{AF507438-7753-43e0-B8FC-AC1667EBCBE1}">
-              <a14:hiddenEffects xmlns:a14="http://schemas.microsoft.com/office/drawing/2010/main" xmlns="">
+              <a14:hiddenEffects xmlns="" xmlns:a14="http://schemas.microsoft.com/office/drawing/2010/main">
                 <a:effectLst>
                   <a:outerShdw blurRad="63500" dist="38099" dir="2700000" algn="ctr" rotWithShape="0">
                     <a:srgbClr val="000000">
@@ -18548,7 +19531,7 @@
           <a:effectLst/>
           <a:extLst>
             <a:ext uri="{909E8E84-426E-40dd-AFC4-6F175D3DCCD1}">
-              <a14:hiddenFill xmlns:a14="http://schemas.microsoft.com/office/drawing/2010/main" xmlns="">
+              <a14:hiddenFill xmlns="" xmlns:a14="http://schemas.microsoft.com/office/drawing/2010/main">
                 <a:blipFill dpi="0" rotWithShape="0">
                   <a:blip/>
                   <a:srcRect/>
@@ -18559,7 +19542,7 @@
               </a14:hiddenFill>
             </a:ext>
             <a:ext uri="{91240B29-F687-4f45-9708-019B960494DF}">
-              <a14:hiddenLine xmlns:a14="http://schemas.microsoft.com/office/drawing/2010/main" xmlns="" w="9525">
+              <a14:hiddenLine xmlns="" xmlns:a14="http://schemas.microsoft.com/office/drawing/2010/main" w="9525">
                 <a:solidFill>
                   <a:srgbClr val="000000"/>
                 </a:solidFill>
@@ -18569,7 +19552,7 @@
               </a14:hiddenLine>
             </a:ext>
             <a:ext uri="{AF507438-7753-43e0-B8FC-AC1667EBCBE1}">
-              <a14:hiddenEffects xmlns:a14="http://schemas.microsoft.com/office/drawing/2010/main" xmlns="">
+              <a14:hiddenEffects xmlns="" xmlns:a14="http://schemas.microsoft.com/office/drawing/2010/main">
                 <a:effectLst>
                   <a:outerShdw blurRad="63500" dist="38099" dir="2700000" algn="ctr" rotWithShape="0">
                     <a:srgbClr val="000000">
@@ -18624,7 +19607,7 @@
           <a:effectLst/>
           <a:extLst>
             <a:ext uri="{909E8E84-426E-40dd-AFC4-6F175D3DCCD1}">
-              <a14:hiddenFill xmlns:a14="http://schemas.microsoft.com/office/drawing/2010/main" xmlns="">
+              <a14:hiddenFill xmlns="" xmlns:a14="http://schemas.microsoft.com/office/drawing/2010/main">
                 <a:blipFill dpi="0" rotWithShape="0">
                   <a:blip/>
                   <a:srcRect/>
@@ -18635,7 +19618,7 @@
               </a14:hiddenFill>
             </a:ext>
             <a:ext uri="{91240B29-F687-4f45-9708-019B960494DF}">
-              <a14:hiddenLine xmlns:a14="http://schemas.microsoft.com/office/drawing/2010/main" xmlns="" w="9525">
+              <a14:hiddenLine xmlns="" xmlns:a14="http://schemas.microsoft.com/office/drawing/2010/main" w="9525">
                 <a:solidFill>
                   <a:srgbClr val="000000"/>
                 </a:solidFill>
@@ -18645,7 +19628,7 @@
               </a14:hiddenLine>
             </a:ext>
             <a:ext uri="{AF507438-7753-43e0-B8FC-AC1667EBCBE1}">
-              <a14:hiddenEffects xmlns:a14="http://schemas.microsoft.com/office/drawing/2010/main" xmlns="">
+              <a14:hiddenEffects xmlns="" xmlns:a14="http://schemas.microsoft.com/office/drawing/2010/main">
                 <a:effectLst>
                   <a:outerShdw blurRad="63500" dist="38099" dir="2700000" algn="ctr" rotWithShape="0">
                     <a:srgbClr val="000000">
@@ -19803,7 +20786,7 @@
 </p:sld>
 </file>
 
-<file path=ppt/slides/slide6.xml><?xml version="1.0" encoding="utf-8"?>
+<file path=ppt/slides/slide7.xml><?xml version="1.0" encoding="utf-8"?>
 <p:sld xmlns:a="http://schemas.openxmlformats.org/drawingml/2006/main" xmlns:r="http://schemas.openxmlformats.org/officeDocument/2006/relationships" xmlns:p="http://schemas.openxmlformats.org/presentationml/2006/main">
   <p:cSld>
     <p:spTree>
@@ -20509,7 +21492,7 @@
 </p:sld>
 </file>
 
-<file path=ppt/slides/slide7.xml><?xml version="1.0" encoding="utf-8"?>
+<file path=ppt/slides/slide8.xml><?xml version="1.0" encoding="utf-8"?>
 <p:sld xmlns:a="http://schemas.openxmlformats.org/drawingml/2006/main" xmlns:r="http://schemas.openxmlformats.org/officeDocument/2006/relationships" xmlns:p="http://schemas.openxmlformats.org/presentationml/2006/main">
   <p:cSld>
     <p:spTree>
@@ -20701,7 +21684,7 @@
           <a:effectLst/>
           <a:extLst>
             <a:ext uri="{909E8E84-426E-40dd-AFC4-6F175D3DCCD1}">
-              <a14:hiddenFill xmlns:a14="http://schemas.microsoft.com/office/drawing/2010/main" xmlns="">
+              <a14:hiddenFill xmlns="" xmlns:a14="http://schemas.microsoft.com/office/drawing/2010/main">
                 <a:blipFill dpi="0" rotWithShape="0">
                   <a:blip/>
                   <a:srcRect/>
@@ -20712,7 +21695,7 @@
               </a14:hiddenFill>
             </a:ext>
             <a:ext uri="{91240B29-F687-4f45-9708-019B960494DF}">
-              <a14:hiddenLine xmlns:a14="http://schemas.microsoft.com/office/drawing/2010/main" xmlns="" w="9525">
+              <a14:hiddenLine xmlns="" xmlns:a14="http://schemas.microsoft.com/office/drawing/2010/main" w="9525">
                 <a:solidFill>
                   <a:srgbClr val="000000"/>
                 </a:solidFill>
@@ -20722,7 +21705,7 @@
               </a14:hiddenLine>
             </a:ext>
             <a:ext uri="{AF507438-7753-43e0-B8FC-AC1667EBCBE1}">
-              <a14:hiddenEffects xmlns:a14="http://schemas.microsoft.com/office/drawing/2010/main" xmlns="">
+              <a14:hiddenEffects xmlns="" xmlns:a14="http://schemas.microsoft.com/office/drawing/2010/main">
                 <a:effectLst>
                   <a:outerShdw blurRad="63500" dist="38099" dir="2700000" algn="ctr" rotWithShape="0">
                     <a:srgbClr val="000000">
@@ -20822,7 +21805,7 @@
           <a:effectLst/>
           <a:extLst>
             <a:ext uri="{909E8E84-426E-40dd-AFC4-6F175D3DCCD1}">
-              <a14:hiddenFill xmlns:a14="http://schemas.microsoft.com/office/drawing/2010/main" xmlns="">
+              <a14:hiddenFill xmlns="" xmlns:a14="http://schemas.microsoft.com/office/drawing/2010/main">
                 <a:blipFill dpi="0" rotWithShape="0">
                   <a:blip/>
                   <a:srcRect/>
@@ -20833,7 +21816,7 @@
               </a14:hiddenFill>
             </a:ext>
             <a:ext uri="{91240B29-F687-4f45-9708-019B960494DF}">
-              <a14:hiddenLine xmlns:a14="http://schemas.microsoft.com/office/drawing/2010/main" xmlns="" w="9525">
+              <a14:hiddenLine xmlns="" xmlns:a14="http://schemas.microsoft.com/office/drawing/2010/main" w="9525">
                 <a:solidFill>
                   <a:srgbClr val="000000"/>
                 </a:solidFill>
@@ -20843,7 +21826,7 @@
               </a14:hiddenLine>
             </a:ext>
             <a:ext uri="{AF507438-7753-43e0-B8FC-AC1667EBCBE1}">
-              <a14:hiddenEffects xmlns:a14="http://schemas.microsoft.com/office/drawing/2010/main" xmlns="">
+              <a14:hiddenEffects xmlns="" xmlns:a14="http://schemas.microsoft.com/office/drawing/2010/main">
                 <a:effectLst>
                   <a:outerShdw blurRad="63500" dist="38099" dir="2700000" algn="ctr" rotWithShape="0">
                     <a:srgbClr val="000000">
@@ -20943,7 +21926,7 @@
           <a:effectLst/>
           <a:extLst>
             <a:ext uri="{909E8E84-426E-40dd-AFC4-6F175D3DCCD1}">
-              <a14:hiddenFill xmlns:a14="http://schemas.microsoft.com/office/drawing/2010/main" xmlns="">
+              <a14:hiddenFill xmlns="" xmlns:a14="http://schemas.microsoft.com/office/drawing/2010/main">
                 <a:blipFill dpi="0" rotWithShape="0">
                   <a:blip/>
                   <a:srcRect/>
@@ -20954,7 +21937,7 @@
               </a14:hiddenFill>
             </a:ext>
             <a:ext uri="{91240B29-F687-4f45-9708-019B960494DF}">
-              <a14:hiddenLine xmlns:a14="http://schemas.microsoft.com/office/drawing/2010/main" xmlns="" w="9525">
+              <a14:hiddenLine xmlns="" xmlns:a14="http://schemas.microsoft.com/office/drawing/2010/main" w="9525">
                 <a:solidFill>
                   <a:srgbClr val="000000"/>
                 </a:solidFill>
@@ -20964,7 +21947,7 @@
               </a14:hiddenLine>
             </a:ext>
             <a:ext uri="{AF507438-7753-43e0-B8FC-AC1667EBCBE1}">
-              <a14:hiddenEffects xmlns:a14="http://schemas.microsoft.com/office/drawing/2010/main" xmlns="">
+              <a14:hiddenEffects xmlns="" xmlns:a14="http://schemas.microsoft.com/office/drawing/2010/main">
                 <a:effectLst>
                   <a:outerShdw blurRad="63500" dist="38099" dir="2700000" algn="ctr" rotWithShape="0">
                     <a:srgbClr val="000000">
@@ -22296,7 +23279,7 @@
 </p:sld>
 </file>
 
-<file path=ppt/slides/slide8.xml><?xml version="1.0" encoding="utf-8"?>
+<file path=ppt/slides/slide9.xml><?xml version="1.0" encoding="utf-8"?>
 <p:sld xmlns:a="http://schemas.openxmlformats.org/drawingml/2006/main" xmlns:r="http://schemas.openxmlformats.org/officeDocument/2006/relationships" xmlns:p="http://schemas.openxmlformats.org/presentationml/2006/main">
   <p:cSld>
     <p:spTree>
@@ -22463,7 +23446,7 @@
           <a:effectLst/>
           <a:extLst>
             <a:ext uri="{909E8E84-426E-40dd-AFC4-6F175D3DCCD1}">
-              <a14:hiddenFill xmlns:a14="http://schemas.microsoft.com/office/drawing/2010/main" xmlns="">
+              <a14:hiddenFill xmlns="" xmlns:a14="http://schemas.microsoft.com/office/drawing/2010/main">
                 <a:blipFill dpi="0" rotWithShape="0">
                   <a:blip/>
                   <a:srcRect/>
@@ -22474,7 +23457,7 @@
               </a14:hiddenFill>
             </a:ext>
             <a:ext uri="{91240B29-F687-4f45-9708-019B960494DF}">
-              <a14:hiddenLine xmlns:a14="http://schemas.microsoft.com/office/drawing/2010/main" xmlns="" w="9525">
+              <a14:hiddenLine xmlns="" xmlns:a14="http://schemas.microsoft.com/office/drawing/2010/main" w="9525">
                 <a:solidFill>
                   <a:srgbClr val="000000"/>
                 </a:solidFill>
@@ -22484,7 +23467,7 @@
               </a14:hiddenLine>
             </a:ext>
             <a:ext uri="{AF507438-7753-43e0-B8FC-AC1667EBCBE1}">
-              <a14:hiddenEffects xmlns:a14="http://schemas.microsoft.com/office/drawing/2010/main" xmlns="">
+              <a14:hiddenEffects xmlns="" xmlns:a14="http://schemas.microsoft.com/office/drawing/2010/main">
                 <a:effectLst>
                   <a:outerShdw blurRad="63500" dist="38099" dir="2700000" algn="ctr" rotWithShape="0">
                     <a:srgbClr val="000000">
@@ -22569,7 +23552,7 @@
           <a:effectLst/>
           <a:extLst>
             <a:ext uri="{909E8E84-426E-40dd-AFC4-6F175D3DCCD1}">
-              <a14:hiddenFill xmlns:a14="http://schemas.microsoft.com/office/drawing/2010/main" xmlns="">
+              <a14:hiddenFill xmlns="" xmlns:a14="http://schemas.microsoft.com/office/drawing/2010/main">
                 <a:blipFill dpi="0" rotWithShape="0">
                   <a:blip/>
                   <a:srcRect/>
@@ -22580,7 +23563,7 @@
               </a14:hiddenFill>
             </a:ext>
             <a:ext uri="{91240B29-F687-4f45-9708-019B960494DF}">
-              <a14:hiddenLine xmlns:a14="http://schemas.microsoft.com/office/drawing/2010/main" xmlns="" w="9525">
+              <a14:hiddenLine xmlns="" xmlns:a14="http://schemas.microsoft.com/office/drawing/2010/main" w="9525">
                 <a:solidFill>
                   <a:srgbClr val="000000"/>
                 </a:solidFill>
@@ -22590,7 +23573,7 @@
               </a14:hiddenLine>
             </a:ext>
             <a:ext uri="{AF507438-7753-43e0-B8FC-AC1667EBCBE1}">
-              <a14:hiddenEffects xmlns:a14="http://schemas.microsoft.com/office/drawing/2010/main" xmlns="">
+              <a14:hiddenEffects xmlns="" xmlns:a14="http://schemas.microsoft.com/office/drawing/2010/main">
                 <a:effectLst>
                   <a:outerShdw blurRad="63500" dist="38099" dir="2700000" algn="ctr" rotWithShape="0">
                     <a:srgbClr val="000000">
@@ -22645,7 +23628,7 @@
           <a:effectLst/>
           <a:extLst>
             <a:ext uri="{909E8E84-426E-40dd-AFC4-6F175D3DCCD1}">
-              <a14:hiddenFill xmlns:a14="http://schemas.microsoft.com/office/drawing/2010/main" xmlns="">
+              <a14:hiddenFill xmlns="" xmlns:a14="http://schemas.microsoft.com/office/drawing/2010/main">
                 <a:blipFill dpi="0" rotWithShape="0">
                   <a:blip/>
                   <a:srcRect/>
@@ -22656,7 +23639,7 @@
               </a14:hiddenFill>
             </a:ext>
             <a:ext uri="{91240B29-F687-4f45-9708-019B960494DF}">
-              <a14:hiddenLine xmlns:a14="http://schemas.microsoft.com/office/drawing/2010/main" xmlns="" w="9525">
+              <a14:hiddenLine xmlns="" xmlns:a14="http://schemas.microsoft.com/office/drawing/2010/main" w="9525">
                 <a:solidFill>
                   <a:srgbClr val="000000"/>
                 </a:solidFill>
@@ -22666,7 +23649,7 @@
               </a14:hiddenLine>
             </a:ext>
             <a:ext uri="{AF507438-7753-43e0-B8FC-AC1667EBCBE1}">
-              <a14:hiddenEffects xmlns:a14="http://schemas.microsoft.com/office/drawing/2010/main" xmlns="">
+              <a14:hiddenEffects xmlns="" xmlns:a14="http://schemas.microsoft.com/office/drawing/2010/main">
                 <a:effectLst>
                   <a:outerShdw blurRad="63500" dist="38099" dir="2700000" algn="ctr" rotWithShape="0">
                     <a:srgbClr val="000000">
@@ -22781,7 +23764,7 @@
           <a:effectLst/>
           <a:extLst>
             <a:ext uri="{909E8E84-426E-40dd-AFC4-6F175D3DCCD1}">
-              <a14:hiddenFill xmlns:a14="http://schemas.microsoft.com/office/drawing/2010/main" xmlns="">
+              <a14:hiddenFill xmlns="" xmlns:a14="http://schemas.microsoft.com/office/drawing/2010/main">
                 <a:blipFill dpi="0" rotWithShape="0">
                   <a:blip/>
                   <a:srcRect/>
@@ -22792,7 +23775,7 @@
               </a14:hiddenFill>
             </a:ext>
             <a:ext uri="{91240B29-F687-4f45-9708-019B960494DF}">
-              <a14:hiddenLine xmlns:a14="http://schemas.microsoft.com/office/drawing/2010/main" xmlns="" w="9525">
+              <a14:hiddenLine xmlns="" xmlns:a14="http://schemas.microsoft.com/office/drawing/2010/main" w="9525">
                 <a:solidFill>
                   <a:srgbClr val="000000"/>
                 </a:solidFill>
@@ -22802,7 +23785,7 @@
               </a14:hiddenLine>
             </a:ext>
             <a:ext uri="{AF507438-7753-43e0-B8FC-AC1667EBCBE1}">
-              <a14:hiddenEffects xmlns:a14="http://schemas.microsoft.com/office/drawing/2010/main" xmlns="">
+              <a14:hiddenEffects xmlns="" xmlns:a14="http://schemas.microsoft.com/office/drawing/2010/main">
                 <a:effectLst>
                   <a:outerShdw blurRad="63500" dist="38099" dir="2700000" algn="ctr" rotWithShape="0">
                     <a:srgbClr val="000000">
@@ -23828,317 +24811,6 @@
 </p:sld>
 </file>
 
-<file path=ppt/slides/slide9.xml><?xml version="1.0" encoding="utf-8"?>
-<p:sld xmlns:a="http://schemas.openxmlformats.org/drawingml/2006/main" xmlns:r="http://schemas.openxmlformats.org/officeDocument/2006/relationships" xmlns:p="http://schemas.openxmlformats.org/presentationml/2006/main">
-  <p:cSld>
-    <p:spTree>
-      <p:nvGrpSpPr>
-        <p:cNvPr id="1" name=""/>
-        <p:cNvGrpSpPr/>
-        <p:nvPr/>
-      </p:nvGrpSpPr>
-      <p:grpSpPr>
-        <a:xfrm>
-          <a:off x="0" y="0"/>
-          <a:ext cx="0" cy="0"/>
-          <a:chOff x="0" y="0"/>
-          <a:chExt cx="0" cy="0"/>
-        </a:xfrm>
-      </p:grpSpPr>
-      <p:sp>
-        <p:nvSpPr>
-          <p:cNvPr id="2" name="Title 1">
-            <a:extLst>
-              <a:ext uri="{FF2B5EF4-FFF2-40B4-BE49-F238E27FC236}">
-                <a16:creationId xmlns:a16="http://schemas.microsoft.com/office/drawing/2014/main" id="{A9E77AE0-A5E4-642E-6FA5-80B45A4B3457}"/>
-              </a:ext>
-            </a:extLst>
-          </p:cNvPr>
-          <p:cNvSpPr>
-            <a:spLocks noGrp="1"/>
-          </p:cNvSpPr>
-          <p:nvPr>
-            <p:ph type="title"/>
-          </p:nvPr>
-        </p:nvSpPr>
-        <p:spPr/>
-        <p:txBody>
-          <a:bodyPr/>
-          <a:lstStyle/>
-          <a:p>
-            <a:r>
-              <a:rPr lang="en-US" dirty="0"/>
-              <a:t>Properties we want: </a:t>
-            </a:r>
-            <a:r>
-              <a:rPr lang="en-US" dirty="0">
-                <a:solidFill>
-                  <a:srgbClr val="C00000"/>
-                </a:solidFill>
-              </a:rPr>
-              <a:t>Safety</a:t>
-            </a:r>
-          </a:p>
-        </p:txBody>
-      </p:sp>
-      <p:sp>
-        <p:nvSpPr>
-          <p:cNvPr id="3" name="Content Placeholder 2">
-            <a:extLst>
-              <a:ext uri="{FF2B5EF4-FFF2-40B4-BE49-F238E27FC236}">
-                <a16:creationId xmlns:a16="http://schemas.microsoft.com/office/drawing/2014/main" id="{3ADD0170-54DF-D8E4-582C-EECA29EDE33F}"/>
-              </a:ext>
-            </a:extLst>
-          </p:cNvPr>
-          <p:cNvSpPr>
-            <a:spLocks noGrp="1"/>
-          </p:cNvSpPr>
-          <p:nvPr>
-            <p:ph idx="1"/>
-          </p:nvPr>
-        </p:nvSpPr>
-        <p:spPr>
-          <a:xfrm>
-            <a:off x="838200" y="1825624"/>
-            <a:ext cx="10515600" cy="5032376"/>
-          </a:xfrm>
-        </p:spPr>
-        <p:txBody>
-          <a:bodyPr/>
-          <a:lstStyle/>
-          <a:p>
-            <a:r>
-              <a:rPr lang="en-US" dirty="0"/>
-              <a:t>If a majority of nodes have agreed on one value, that value cannot change in the future</a:t>
-            </a:r>
-          </a:p>
-          <a:p>
-            <a:endParaRPr lang="en-US" dirty="0"/>
-          </a:p>
-          <a:p>
-            <a:r>
-              <a:rPr lang="en-US" dirty="0"/>
-              <a:t>e.g., using a different majority or the same majority</a:t>
-            </a:r>
-          </a:p>
-          <a:p>
-            <a:pPr lvl="1"/>
-            <a:endParaRPr lang="en-US" dirty="0"/>
-          </a:p>
-          <a:p>
-            <a:r>
-              <a:rPr lang="en-US" dirty="0"/>
-              <a:t>We call this value the </a:t>
-            </a:r>
-            <a:r>
-              <a:rPr lang="en-US" dirty="0">
-                <a:solidFill>
-                  <a:srgbClr val="C00000"/>
-                </a:solidFill>
-              </a:rPr>
-              <a:t>chosen</a:t>
-            </a:r>
-            <a:r>
-              <a:rPr lang="en-US" dirty="0"/>
-              <a:t> value</a:t>
-            </a:r>
-          </a:p>
-          <a:p>
-            <a:pPr lvl="1"/>
-            <a:endParaRPr lang="en-US" dirty="0"/>
-          </a:p>
-        </p:txBody>
-      </p:sp>
-    </p:spTree>
-    <p:extLst>
-      <p:ext uri="{BB962C8B-B14F-4D97-AF65-F5344CB8AC3E}">
-        <p14:creationId xmlns:p14="http://schemas.microsoft.com/office/powerpoint/2010/main" val="603974117"/>
-      </p:ext>
-    </p:extLst>
-  </p:cSld>
-  <p:clrMapOvr>
-    <a:masterClrMapping/>
-  </p:clrMapOvr>
-  <p:timing>
-    <p:tnLst>
-      <p:par>
-        <p:cTn id="1" dur="indefinite" restart="never" nodeType="tmRoot">
-          <p:childTnLst>
-            <p:seq concurrent="1" nextAc="seek">
-              <p:cTn id="2" dur="indefinite" nodeType="mainSeq">
-                <p:childTnLst>
-                  <p:par>
-                    <p:cTn id="3" fill="hold">
-                      <p:stCondLst>
-                        <p:cond delay="indefinite"/>
-                      </p:stCondLst>
-                      <p:childTnLst>
-                        <p:par>
-                          <p:cTn id="4" fill="hold">
-                            <p:stCondLst>
-                              <p:cond delay="0"/>
-                            </p:stCondLst>
-                            <p:childTnLst>
-                              <p:par>
-                                <p:cTn id="5" presetID="1" presetClass="entr" presetSubtype="0" fill="hold" nodeType="clickEffect">
-                                  <p:stCondLst>
-                                    <p:cond delay="0"/>
-                                  </p:stCondLst>
-                                  <p:childTnLst>
-                                    <p:set>
-                                      <p:cBhvr>
-                                        <p:cTn id="6" dur="1" fill="hold">
-                                          <p:stCondLst>
-                                            <p:cond delay="0"/>
-                                          </p:stCondLst>
-                                        </p:cTn>
-                                        <p:tgtEl>
-                                          <p:spTgt spid="3">
-                                            <p:txEl>
-                                              <p:pRg st="0" end="0"/>
-                                            </p:txEl>
-                                          </p:spTgt>
-                                        </p:tgtEl>
-                                        <p:attrNameLst>
-                                          <p:attrName>style.visibility</p:attrName>
-                                        </p:attrNameLst>
-                                      </p:cBhvr>
-                                      <p:to>
-                                        <p:strVal val="visible"/>
-                                      </p:to>
-                                    </p:set>
-                                  </p:childTnLst>
-                                </p:cTn>
-                              </p:par>
-                            </p:childTnLst>
-                          </p:cTn>
-                        </p:par>
-                      </p:childTnLst>
-                    </p:cTn>
-                  </p:par>
-                  <p:par>
-                    <p:cTn id="7" fill="hold">
-                      <p:stCondLst>
-                        <p:cond delay="indefinite"/>
-                      </p:stCondLst>
-                      <p:childTnLst>
-                        <p:par>
-                          <p:cTn id="8" fill="hold">
-                            <p:stCondLst>
-                              <p:cond delay="0"/>
-                            </p:stCondLst>
-                            <p:childTnLst>
-                              <p:par>
-                                <p:cTn id="9" presetID="1" presetClass="entr" presetSubtype="0" fill="hold" nodeType="clickEffect">
-                                  <p:stCondLst>
-                                    <p:cond delay="0"/>
-                                  </p:stCondLst>
-                                  <p:childTnLst>
-                                    <p:set>
-                                      <p:cBhvr>
-                                        <p:cTn id="10" dur="1" fill="hold">
-                                          <p:stCondLst>
-                                            <p:cond delay="0"/>
-                                          </p:stCondLst>
-                                        </p:cTn>
-                                        <p:tgtEl>
-                                          <p:spTgt spid="3">
-                                            <p:txEl>
-                                              <p:pRg st="2" end="2"/>
-                                            </p:txEl>
-                                          </p:spTgt>
-                                        </p:tgtEl>
-                                        <p:attrNameLst>
-                                          <p:attrName>style.visibility</p:attrName>
-                                        </p:attrNameLst>
-                                      </p:cBhvr>
-                                      <p:to>
-                                        <p:strVal val="visible"/>
-                                      </p:to>
-                                    </p:set>
-                                  </p:childTnLst>
-                                </p:cTn>
-                              </p:par>
-                            </p:childTnLst>
-                          </p:cTn>
-                        </p:par>
-                      </p:childTnLst>
-                    </p:cTn>
-                  </p:par>
-                  <p:par>
-                    <p:cTn id="11" fill="hold">
-                      <p:stCondLst>
-                        <p:cond delay="indefinite"/>
-                      </p:stCondLst>
-                      <p:childTnLst>
-                        <p:par>
-                          <p:cTn id="12" fill="hold">
-                            <p:stCondLst>
-                              <p:cond delay="0"/>
-                            </p:stCondLst>
-                            <p:childTnLst>
-                              <p:par>
-                                <p:cTn id="13" presetID="1" presetClass="entr" presetSubtype="0" fill="hold" nodeType="clickEffect">
-                                  <p:stCondLst>
-                                    <p:cond delay="0"/>
-                                  </p:stCondLst>
-                                  <p:childTnLst>
-                                    <p:set>
-                                      <p:cBhvr>
-                                        <p:cTn id="14" dur="1" fill="hold">
-                                          <p:stCondLst>
-                                            <p:cond delay="0"/>
-                                          </p:stCondLst>
-                                        </p:cTn>
-                                        <p:tgtEl>
-                                          <p:spTgt spid="3">
-                                            <p:txEl>
-                                              <p:pRg st="4" end="4"/>
-                                            </p:txEl>
-                                          </p:spTgt>
-                                        </p:tgtEl>
-                                        <p:attrNameLst>
-                                          <p:attrName>style.visibility</p:attrName>
-                                        </p:attrNameLst>
-                                      </p:cBhvr>
-                                      <p:to>
-                                        <p:strVal val="visible"/>
-                                      </p:to>
-                                    </p:set>
-                                  </p:childTnLst>
-                                </p:cTn>
-                              </p:par>
-                            </p:childTnLst>
-                          </p:cTn>
-                        </p:par>
-                      </p:childTnLst>
-                    </p:cTn>
-                  </p:par>
-                </p:childTnLst>
-              </p:cTn>
-              <p:prevCondLst>
-                <p:cond evt="onPrev" delay="0">
-                  <p:tgtEl>
-                    <p:sldTgt/>
-                  </p:tgtEl>
-                </p:cond>
-              </p:prevCondLst>
-              <p:nextCondLst>
-                <p:cond evt="onNext" delay="0">
-                  <p:tgtEl>
-                    <p:sldTgt/>
-                  </p:tgtEl>
-                </p:cond>
-              </p:nextCondLst>
-            </p:seq>
-          </p:childTnLst>
-        </p:cTn>
-      </p:par>
-    </p:tnLst>
-  </p:timing>
-</p:sld>
-</file>
-
 <file path=ppt/theme/theme1.xml><?xml version="1.0" encoding="utf-8"?>
 <a:theme xmlns:a="http://schemas.openxmlformats.org/drawingml/2006/main" name="Office Theme">
   <a:themeElements>

</xml_diff>